<commit_message>
Additional information for classes and objects
</commit_message>
<xml_diff>
--- a/05.classes-and-object.pptx
+++ b/05.classes-and-object.pptx
@@ -10,6 +10,10 @@
     <p:sldId id="258" r:id="rId4"/>
     <p:sldId id="259" r:id="rId5"/>
     <p:sldId id="260" r:id="rId6"/>
+    <p:sldId id="261" r:id="rId7"/>
+    <p:sldId id="262" r:id="rId8"/>
+    <p:sldId id="263" r:id="rId9"/>
+    <p:sldId id="264" r:id="rId10"/>
   </p:sldIdLst>
   <p:sldSz cx="12192000" cy="6858000"/>
   <p:notesSz cx="6858000" cy="9144000"/>
@@ -166,7 +170,7 @@
           <a:noFill/>
           <a:extLst>
             <a:ext uri="{909E8E84-426E-40dd-AFC4-6F175D3DCCD1}">
-              <a14:hiddenFill xmlns="" xmlns:a14="http://schemas.microsoft.com/office/drawing/2010/main">
+              <a14:hiddenFill xmlns:a14="http://schemas.microsoft.com/office/drawing/2010/main" xmlns="">
                 <a:solidFill>
                   <a:srgbClr val="FFFFFF"/>
                 </a:solidFill>
@@ -226,7 +230,7 @@
             </a:ln>
             <a:extLst>
               <a:ext uri="{91240B29-F687-4f45-9708-019B960494DF}">
-                <a14:hiddenLine xmlns="" xmlns:a14="http://schemas.microsoft.com/office/drawing/2010/main" w="9525">
+                <a14:hiddenLine xmlns:a14="http://schemas.microsoft.com/office/drawing/2010/main" xmlns="" w="9525">
                   <a:solidFill>
                     <a:srgbClr val="000000"/>
                   </a:solidFill>
@@ -316,7 +320,7 @@
             </a:ln>
             <a:extLst>
               <a:ext uri="{91240B29-F687-4f45-9708-019B960494DF}">
-                <a14:hiddenLine xmlns="" xmlns:a14="http://schemas.microsoft.com/office/drawing/2010/main" w="9525">
+                <a14:hiddenLine xmlns:a14="http://schemas.microsoft.com/office/drawing/2010/main" xmlns="" w="9525">
                   <a:solidFill>
                     <a:srgbClr val="000000"/>
                   </a:solidFill>
@@ -406,7 +410,7 @@
             </a:ln>
             <a:extLst>
               <a:ext uri="{91240B29-F687-4f45-9708-019B960494DF}">
-                <a14:hiddenLine xmlns="" xmlns:a14="http://schemas.microsoft.com/office/drawing/2010/main" w="9525">
+                <a14:hiddenLine xmlns:a14="http://schemas.microsoft.com/office/drawing/2010/main" xmlns="" w="9525">
                   <a:solidFill>
                     <a:srgbClr val="000000"/>
                   </a:solidFill>
@@ -440,7 +444,7 @@
             </a:ln>
             <a:extLst>
               <a:ext uri="{91240B29-F687-4f45-9708-019B960494DF}">
-                <a14:hiddenLine xmlns="" xmlns:a14="http://schemas.microsoft.com/office/drawing/2010/main" w="9525">
+                <a14:hiddenLine xmlns:a14="http://schemas.microsoft.com/office/drawing/2010/main" xmlns="" w="9525">
                   <a:solidFill>
                     <a:srgbClr val="000000"/>
                   </a:solidFill>
@@ -530,7 +534,7 @@
             </a:ln>
             <a:extLst>
               <a:ext uri="{91240B29-F687-4f45-9708-019B960494DF}">
-                <a14:hiddenLine xmlns="" xmlns:a14="http://schemas.microsoft.com/office/drawing/2010/main" w="9525">
+                <a14:hiddenLine xmlns:a14="http://schemas.microsoft.com/office/drawing/2010/main" xmlns="" w="9525">
                   <a:solidFill>
                     <a:srgbClr val="000000"/>
                   </a:solidFill>
@@ -592,7 +596,7 @@
             </a:ln>
             <a:extLst>
               <a:ext uri="{91240B29-F687-4f45-9708-019B960494DF}">
-                <a14:hiddenLine xmlns="" xmlns:a14="http://schemas.microsoft.com/office/drawing/2010/main" w="9525">
+                <a14:hiddenLine xmlns:a14="http://schemas.microsoft.com/office/drawing/2010/main" xmlns="" w="9525">
                   <a:solidFill>
                     <a:srgbClr val="000000"/>
                   </a:solidFill>
@@ -654,7 +658,7 @@
             </a:ln>
             <a:extLst>
               <a:ext uri="{91240B29-F687-4f45-9708-019B960494DF}">
-                <a14:hiddenLine xmlns="" xmlns:a14="http://schemas.microsoft.com/office/drawing/2010/main" w="9525">
+                <a14:hiddenLine xmlns:a14="http://schemas.microsoft.com/office/drawing/2010/main" xmlns="" w="9525">
                   <a:solidFill>
                     <a:srgbClr val="000000"/>
                   </a:solidFill>
@@ -744,7 +748,7 @@
             </a:ln>
             <a:extLst>
               <a:ext uri="{91240B29-F687-4f45-9708-019B960494DF}">
-                <a14:hiddenLine xmlns="" xmlns:a14="http://schemas.microsoft.com/office/drawing/2010/main" w="9525">
+                <a14:hiddenLine xmlns:a14="http://schemas.microsoft.com/office/drawing/2010/main" xmlns="" w="9525">
                   <a:solidFill>
                     <a:srgbClr val="000000"/>
                   </a:solidFill>
@@ -806,7 +810,7 @@
             </a:ln>
             <a:extLst>
               <a:ext uri="{91240B29-F687-4f45-9708-019B960494DF}">
-                <a14:hiddenLine xmlns="" xmlns:a14="http://schemas.microsoft.com/office/drawing/2010/main" w="9525">
+                <a14:hiddenLine xmlns:a14="http://schemas.microsoft.com/office/drawing/2010/main" xmlns="" w="9525">
                   <a:solidFill>
                     <a:srgbClr val="000000"/>
                   </a:solidFill>
@@ -868,7 +872,7 @@
             </a:ln>
             <a:extLst>
               <a:ext uri="{91240B29-F687-4f45-9708-019B960494DF}">
-                <a14:hiddenLine xmlns="" xmlns:a14="http://schemas.microsoft.com/office/drawing/2010/main" w="9525">
+                <a14:hiddenLine xmlns:a14="http://schemas.microsoft.com/office/drawing/2010/main" xmlns="" w="9525">
                   <a:solidFill>
                     <a:srgbClr val="000000"/>
                   </a:solidFill>
@@ -958,7 +962,7 @@
             </a:ln>
             <a:extLst>
               <a:ext uri="{91240B29-F687-4f45-9708-019B960494DF}">
-                <a14:hiddenLine xmlns="" xmlns:a14="http://schemas.microsoft.com/office/drawing/2010/main" w="9525">
+                <a14:hiddenLine xmlns:a14="http://schemas.microsoft.com/office/drawing/2010/main" xmlns="" w="9525">
                   <a:solidFill>
                     <a:srgbClr val="000000"/>
                   </a:solidFill>
@@ -1048,7 +1052,7 @@
             </a:ln>
             <a:extLst>
               <a:ext uri="{91240B29-F687-4f45-9708-019B960494DF}">
-                <a14:hiddenLine xmlns="" xmlns:a14="http://schemas.microsoft.com/office/drawing/2010/main" w="9525">
+                <a14:hiddenLine xmlns:a14="http://schemas.microsoft.com/office/drawing/2010/main" xmlns="" w="9525">
                   <a:solidFill>
                     <a:srgbClr val="000000"/>
                   </a:solidFill>
@@ -1110,7 +1114,7 @@
             </a:ln>
             <a:extLst>
               <a:ext uri="{91240B29-F687-4f45-9708-019B960494DF}">
-                <a14:hiddenLine xmlns="" xmlns:a14="http://schemas.microsoft.com/office/drawing/2010/main" w="9525">
+                <a14:hiddenLine xmlns:a14="http://schemas.microsoft.com/office/drawing/2010/main" xmlns="" w="9525">
                   <a:solidFill>
                     <a:srgbClr val="000000"/>
                   </a:solidFill>
@@ -1220,7 +1224,7 @@
             </a:ln>
             <a:extLst>
               <a:ext uri="{91240B29-F687-4f45-9708-019B960494DF}">
-                <a14:hiddenLine xmlns="" xmlns:a14="http://schemas.microsoft.com/office/drawing/2010/main" w="9525">
+                <a14:hiddenLine xmlns:a14="http://schemas.microsoft.com/office/drawing/2010/main" xmlns="" w="9525">
                   <a:solidFill>
                     <a:srgbClr val="000000"/>
                   </a:solidFill>
@@ -1282,7 +1286,7 @@
             </a:ln>
             <a:extLst>
               <a:ext uri="{91240B29-F687-4f45-9708-019B960494DF}">
-                <a14:hiddenLine xmlns="" xmlns:a14="http://schemas.microsoft.com/office/drawing/2010/main" w="9525">
+                <a14:hiddenLine xmlns:a14="http://schemas.microsoft.com/office/drawing/2010/main" xmlns="" w="9525">
                   <a:solidFill>
                     <a:srgbClr val="000000"/>
                   </a:solidFill>
@@ -1372,7 +1376,7 @@
             </a:ln>
             <a:extLst>
               <a:ext uri="{91240B29-F687-4f45-9708-019B960494DF}">
-                <a14:hiddenLine xmlns="" xmlns:a14="http://schemas.microsoft.com/office/drawing/2010/main" w="9525">
+                <a14:hiddenLine xmlns:a14="http://schemas.microsoft.com/office/drawing/2010/main" xmlns="" w="9525">
                   <a:solidFill>
                     <a:srgbClr val="000000"/>
                   </a:solidFill>
@@ -1462,7 +1466,7 @@
             </a:ln>
             <a:extLst>
               <a:ext uri="{91240B29-F687-4f45-9708-019B960494DF}">
-                <a14:hiddenLine xmlns="" xmlns:a14="http://schemas.microsoft.com/office/drawing/2010/main" w="9525">
+                <a14:hiddenLine xmlns:a14="http://schemas.microsoft.com/office/drawing/2010/main" xmlns="" w="9525">
                   <a:solidFill>
                     <a:srgbClr val="000000"/>
                   </a:solidFill>
@@ -1524,7 +1528,7 @@
             </a:ln>
             <a:extLst>
               <a:ext uri="{91240B29-F687-4f45-9708-019B960494DF}">
-                <a14:hiddenLine xmlns="" xmlns:a14="http://schemas.microsoft.com/office/drawing/2010/main" w="9525">
+                <a14:hiddenLine xmlns:a14="http://schemas.microsoft.com/office/drawing/2010/main" xmlns="" w="9525">
                   <a:solidFill>
                     <a:srgbClr val="000000"/>
                   </a:solidFill>
@@ -1614,7 +1618,7 @@
             </a:ln>
             <a:extLst>
               <a:ext uri="{91240B29-F687-4f45-9708-019B960494DF}">
-                <a14:hiddenLine xmlns="" xmlns:a14="http://schemas.microsoft.com/office/drawing/2010/main" w="9525">
+                <a14:hiddenLine xmlns:a14="http://schemas.microsoft.com/office/drawing/2010/main" xmlns="" w="9525">
                   <a:solidFill>
                     <a:srgbClr val="000000"/>
                   </a:solidFill>
@@ -1704,7 +1708,7 @@
             </a:ln>
             <a:extLst>
               <a:ext uri="{91240B29-F687-4f45-9708-019B960494DF}">
-                <a14:hiddenLine xmlns="" xmlns:a14="http://schemas.microsoft.com/office/drawing/2010/main" w="9525">
+                <a14:hiddenLine xmlns:a14="http://schemas.microsoft.com/office/drawing/2010/main" xmlns="" w="9525">
                   <a:solidFill>
                     <a:srgbClr val="000000"/>
                   </a:solidFill>
@@ -1760,7 +1764,7 @@
             </a:ln>
             <a:extLst>
               <a:ext uri="{91240B29-F687-4f45-9708-019B960494DF}">
-                <a14:hiddenLine xmlns="" xmlns:a14="http://schemas.microsoft.com/office/drawing/2010/main" w="9525">
+                <a14:hiddenLine xmlns:a14="http://schemas.microsoft.com/office/drawing/2010/main" xmlns="" w="9525">
                   <a:solidFill>
                     <a:srgbClr val="000000"/>
                   </a:solidFill>
@@ -1850,7 +1854,7 @@
             </a:ln>
             <a:extLst>
               <a:ext uri="{91240B29-F687-4f45-9708-019B960494DF}">
-                <a14:hiddenLine xmlns="" xmlns:a14="http://schemas.microsoft.com/office/drawing/2010/main" w="9525">
+                <a14:hiddenLine xmlns:a14="http://schemas.microsoft.com/office/drawing/2010/main" xmlns="" w="9525">
                   <a:solidFill>
                     <a:srgbClr val="000000"/>
                   </a:solidFill>
@@ -1906,7 +1910,7 @@
             </a:ln>
             <a:extLst>
               <a:ext uri="{91240B29-F687-4f45-9708-019B960494DF}">
-                <a14:hiddenLine xmlns="" xmlns:a14="http://schemas.microsoft.com/office/drawing/2010/main" w="9525">
+                <a14:hiddenLine xmlns:a14="http://schemas.microsoft.com/office/drawing/2010/main" xmlns="" w="9525">
                   <a:solidFill>
                     <a:srgbClr val="000000"/>
                   </a:solidFill>
@@ -1996,7 +2000,7 @@
             </a:ln>
             <a:extLst>
               <a:ext uri="{91240B29-F687-4f45-9708-019B960494DF}">
-                <a14:hiddenLine xmlns="" xmlns:a14="http://schemas.microsoft.com/office/drawing/2010/main" w="9525">
+                <a14:hiddenLine xmlns:a14="http://schemas.microsoft.com/office/drawing/2010/main" xmlns="" w="9525">
                   <a:solidFill>
                     <a:srgbClr val="000000"/>
                   </a:solidFill>
@@ -2064,7 +2068,7 @@
             </a:ln>
             <a:extLst>
               <a:ext uri="{91240B29-F687-4f45-9708-019B960494DF}">
-                <a14:hiddenLine xmlns="" xmlns:a14="http://schemas.microsoft.com/office/drawing/2010/main" w="9525">
+                <a14:hiddenLine xmlns:a14="http://schemas.microsoft.com/office/drawing/2010/main" xmlns="" w="9525">
                   <a:solidFill>
                     <a:srgbClr val="000000"/>
                   </a:solidFill>
@@ -2154,7 +2158,7 @@
             </a:ln>
             <a:extLst>
               <a:ext uri="{91240B29-F687-4f45-9708-019B960494DF}">
-                <a14:hiddenLine xmlns="" xmlns:a14="http://schemas.microsoft.com/office/drawing/2010/main" w="9525">
+                <a14:hiddenLine xmlns:a14="http://schemas.microsoft.com/office/drawing/2010/main" xmlns="" w="9525">
                   <a:solidFill>
                     <a:srgbClr val="000000"/>
                   </a:solidFill>
@@ -2222,7 +2226,7 @@
             </a:ln>
             <a:extLst>
               <a:ext uri="{91240B29-F687-4f45-9708-019B960494DF}">
-                <a14:hiddenLine xmlns="" xmlns:a14="http://schemas.microsoft.com/office/drawing/2010/main" w="9525">
+                <a14:hiddenLine xmlns:a14="http://schemas.microsoft.com/office/drawing/2010/main" xmlns="" w="9525">
                   <a:solidFill>
                     <a:srgbClr val="000000"/>
                   </a:solidFill>
@@ -2312,7 +2316,7 @@
             </a:ln>
             <a:extLst>
               <a:ext uri="{91240B29-F687-4f45-9708-019B960494DF}">
-                <a14:hiddenLine xmlns="" xmlns:a14="http://schemas.microsoft.com/office/drawing/2010/main" w="9525">
+                <a14:hiddenLine xmlns:a14="http://schemas.microsoft.com/office/drawing/2010/main" xmlns="" w="9525">
                   <a:solidFill>
                     <a:srgbClr val="000000"/>
                   </a:solidFill>
@@ -2346,7 +2350,7 @@
             </a:ln>
             <a:extLst>
               <a:ext uri="{91240B29-F687-4f45-9708-019B960494DF}">
-                <a14:hiddenLine xmlns="" xmlns:a14="http://schemas.microsoft.com/office/drawing/2010/main" w="9525">
+                <a14:hiddenLine xmlns:a14="http://schemas.microsoft.com/office/drawing/2010/main" xmlns="" w="9525">
                   <a:solidFill>
                     <a:srgbClr val="000000"/>
                   </a:solidFill>
@@ -2436,7 +2440,7 @@
             </a:ln>
             <a:extLst>
               <a:ext uri="{91240B29-F687-4f45-9708-019B960494DF}">
-                <a14:hiddenLine xmlns="" xmlns:a14="http://schemas.microsoft.com/office/drawing/2010/main" w="9525">
+                <a14:hiddenLine xmlns:a14="http://schemas.microsoft.com/office/drawing/2010/main" xmlns="" w="9525">
                   <a:solidFill>
                     <a:srgbClr val="000000"/>
                   </a:solidFill>
@@ -2498,7 +2502,7 @@
             </a:ln>
             <a:extLst>
               <a:ext uri="{91240B29-F687-4f45-9708-019B960494DF}">
-                <a14:hiddenLine xmlns="" xmlns:a14="http://schemas.microsoft.com/office/drawing/2010/main" w="9525">
+                <a14:hiddenLine xmlns:a14="http://schemas.microsoft.com/office/drawing/2010/main" xmlns="" w="9525">
                   <a:solidFill>
                     <a:srgbClr val="000000"/>
                   </a:solidFill>
@@ -2560,7 +2564,7 @@
             </a:ln>
             <a:extLst>
               <a:ext uri="{91240B29-F687-4f45-9708-019B960494DF}">
-                <a14:hiddenLine xmlns="" xmlns:a14="http://schemas.microsoft.com/office/drawing/2010/main" w="9525">
+                <a14:hiddenLine xmlns:a14="http://schemas.microsoft.com/office/drawing/2010/main" xmlns="" w="9525">
                   <a:solidFill>
                     <a:srgbClr val="000000"/>
                   </a:solidFill>
@@ -2650,7 +2654,7 @@
             </a:ln>
             <a:extLst>
               <a:ext uri="{91240B29-F687-4f45-9708-019B960494DF}">
-                <a14:hiddenLine xmlns="" xmlns:a14="http://schemas.microsoft.com/office/drawing/2010/main" w="9525">
+                <a14:hiddenLine xmlns:a14="http://schemas.microsoft.com/office/drawing/2010/main" xmlns="" w="9525">
                   <a:solidFill>
                     <a:srgbClr val="000000"/>
                   </a:solidFill>
@@ -2718,7 +2722,7 @@
             </a:ln>
             <a:extLst>
               <a:ext uri="{91240B29-F687-4f45-9708-019B960494DF}">
-                <a14:hiddenLine xmlns="" xmlns:a14="http://schemas.microsoft.com/office/drawing/2010/main" w="9525">
+                <a14:hiddenLine xmlns:a14="http://schemas.microsoft.com/office/drawing/2010/main" xmlns="" w="9525">
                   <a:solidFill>
                     <a:srgbClr val="000000"/>
                   </a:solidFill>
@@ -2780,7 +2784,7 @@
             </a:ln>
             <a:extLst>
               <a:ext uri="{91240B29-F687-4f45-9708-019B960494DF}">
-                <a14:hiddenLine xmlns="" xmlns:a14="http://schemas.microsoft.com/office/drawing/2010/main" w="9525">
+                <a14:hiddenLine xmlns:a14="http://schemas.microsoft.com/office/drawing/2010/main" xmlns="" w="9525">
                   <a:solidFill>
                     <a:srgbClr val="000000"/>
                   </a:solidFill>
@@ -2870,7 +2874,7 @@
             </a:ln>
             <a:extLst>
               <a:ext uri="{91240B29-F687-4f45-9708-019B960494DF}">
-                <a14:hiddenLine xmlns="" xmlns:a14="http://schemas.microsoft.com/office/drawing/2010/main" w="9525">
+                <a14:hiddenLine xmlns:a14="http://schemas.microsoft.com/office/drawing/2010/main" xmlns="" w="9525">
                   <a:solidFill>
                     <a:srgbClr val="000000"/>
                   </a:solidFill>
@@ -2932,7 +2936,7 @@
             </a:ln>
             <a:extLst>
               <a:ext uri="{91240B29-F687-4f45-9708-019B960494DF}">
-                <a14:hiddenLine xmlns="" xmlns:a14="http://schemas.microsoft.com/office/drawing/2010/main" w="9525">
+                <a14:hiddenLine xmlns:a14="http://schemas.microsoft.com/office/drawing/2010/main" xmlns="" w="9525">
                   <a:solidFill>
                     <a:srgbClr val="000000"/>
                   </a:solidFill>
@@ -3022,7 +3026,7 @@
             </a:ln>
             <a:extLst>
               <a:ext uri="{91240B29-F687-4f45-9708-019B960494DF}">
-                <a14:hiddenLine xmlns="" xmlns:a14="http://schemas.microsoft.com/office/drawing/2010/main" w="9525">
+                <a14:hiddenLine xmlns:a14="http://schemas.microsoft.com/office/drawing/2010/main" xmlns="" w="9525">
                   <a:solidFill>
                     <a:srgbClr val="000000"/>
                   </a:solidFill>
@@ -3084,7 +3088,7 @@
             </a:ln>
             <a:extLst>
               <a:ext uri="{91240B29-F687-4f45-9708-019B960494DF}">
-                <a14:hiddenLine xmlns="" xmlns:a14="http://schemas.microsoft.com/office/drawing/2010/main" w="9525">
+                <a14:hiddenLine xmlns:a14="http://schemas.microsoft.com/office/drawing/2010/main" xmlns="" w="9525">
                   <a:solidFill>
                     <a:srgbClr val="000000"/>
                   </a:solidFill>
@@ -3174,7 +3178,7 @@
             </a:ln>
             <a:extLst>
               <a:ext uri="{91240B29-F687-4f45-9708-019B960494DF}">
-                <a14:hiddenLine xmlns="" xmlns:a14="http://schemas.microsoft.com/office/drawing/2010/main" w="9525">
+                <a14:hiddenLine xmlns:a14="http://schemas.microsoft.com/office/drawing/2010/main" xmlns="" w="9525">
                   <a:solidFill>
                     <a:srgbClr val="000000"/>
                   </a:solidFill>
@@ -3208,7 +3212,7 @@
             </a:ln>
             <a:extLst>
               <a:ext uri="{91240B29-F687-4f45-9708-019B960494DF}">
-                <a14:hiddenLine xmlns="" xmlns:a14="http://schemas.microsoft.com/office/drawing/2010/main" w="9525">
+                <a14:hiddenLine xmlns:a14="http://schemas.microsoft.com/office/drawing/2010/main" xmlns="" w="9525">
                   <a:solidFill>
                     <a:srgbClr val="000000"/>
                   </a:solidFill>
@@ -3273,7 +3277,7 @@
             </a:ln>
             <a:extLst>
               <a:ext uri="{91240B29-F687-4f45-9708-019B960494DF}">
-                <a14:hiddenLine xmlns="" xmlns:a14="http://schemas.microsoft.com/office/drawing/2010/main" w="9525">
+                <a14:hiddenLine xmlns:a14="http://schemas.microsoft.com/office/drawing/2010/main" xmlns="" w="9525">
                   <a:solidFill>
                     <a:srgbClr val="000000"/>
                   </a:solidFill>
@@ -3363,7 +3367,7 @@
             </a:ln>
             <a:extLst>
               <a:ext uri="{91240B29-F687-4f45-9708-019B960494DF}">
-                <a14:hiddenLine xmlns="" xmlns:a14="http://schemas.microsoft.com/office/drawing/2010/main" w="9525">
+                <a14:hiddenLine xmlns:a14="http://schemas.microsoft.com/office/drawing/2010/main" xmlns="" w="9525">
                   <a:solidFill>
                     <a:srgbClr val="000000"/>
                   </a:solidFill>
@@ -3425,7 +3429,7 @@
             </a:ln>
             <a:extLst>
               <a:ext uri="{91240B29-F687-4f45-9708-019B960494DF}">
-                <a14:hiddenLine xmlns="" xmlns:a14="http://schemas.microsoft.com/office/drawing/2010/main" w="9525">
+                <a14:hiddenLine xmlns:a14="http://schemas.microsoft.com/office/drawing/2010/main" xmlns="" w="9525">
                   <a:solidFill>
                     <a:srgbClr val="000000"/>
                   </a:solidFill>
@@ -3515,7 +3519,7 @@
             </a:ln>
             <a:extLst>
               <a:ext uri="{91240B29-F687-4f45-9708-019B960494DF}">
-                <a14:hiddenLine xmlns="" xmlns:a14="http://schemas.microsoft.com/office/drawing/2010/main" w="9525">
+                <a14:hiddenLine xmlns:a14="http://schemas.microsoft.com/office/drawing/2010/main" xmlns="" w="9525">
                   <a:solidFill>
                     <a:srgbClr val="000000"/>
                   </a:solidFill>
@@ -3605,7 +3609,7 @@
             </a:ln>
             <a:extLst>
               <a:ext uri="{91240B29-F687-4f45-9708-019B960494DF}">
-                <a14:hiddenLine xmlns="" xmlns:a14="http://schemas.microsoft.com/office/drawing/2010/main" w="9525">
+                <a14:hiddenLine xmlns:a14="http://schemas.microsoft.com/office/drawing/2010/main" xmlns="" w="9525">
                   <a:solidFill>
                     <a:srgbClr val="000000"/>
                   </a:solidFill>
@@ -3670,7 +3674,7 @@
             </a:ln>
             <a:extLst>
               <a:ext uri="{91240B29-F687-4f45-9708-019B960494DF}">
-                <a14:hiddenLine xmlns="" xmlns:a14="http://schemas.microsoft.com/office/drawing/2010/main" w="9525">
+                <a14:hiddenLine xmlns:a14="http://schemas.microsoft.com/office/drawing/2010/main" xmlns="" w="9525">
                   <a:solidFill>
                     <a:srgbClr val="000000"/>
                   </a:solidFill>
@@ -3732,7 +3736,7 @@
             </a:ln>
             <a:extLst>
               <a:ext uri="{91240B29-F687-4f45-9708-019B960494DF}">
-                <a14:hiddenLine xmlns="" xmlns:a14="http://schemas.microsoft.com/office/drawing/2010/main" w="9525">
+                <a14:hiddenLine xmlns:a14="http://schemas.microsoft.com/office/drawing/2010/main" xmlns="" w="9525">
                   <a:solidFill>
                     <a:srgbClr val="000000"/>
                   </a:solidFill>
@@ -3822,7 +3826,7 @@
             </a:ln>
             <a:extLst>
               <a:ext uri="{91240B29-F687-4f45-9708-019B960494DF}">
-                <a14:hiddenLine xmlns="" xmlns:a14="http://schemas.microsoft.com/office/drawing/2010/main" w="9525">
+                <a14:hiddenLine xmlns:a14="http://schemas.microsoft.com/office/drawing/2010/main" xmlns="" w="9525">
                   <a:solidFill>
                     <a:srgbClr val="000000"/>
                   </a:solidFill>
@@ -3912,7 +3916,7 @@
             </a:ln>
             <a:extLst>
               <a:ext uri="{91240B29-F687-4f45-9708-019B960494DF}">
-                <a14:hiddenLine xmlns="" xmlns:a14="http://schemas.microsoft.com/office/drawing/2010/main" w="9525">
+                <a14:hiddenLine xmlns:a14="http://schemas.microsoft.com/office/drawing/2010/main" xmlns="" w="9525">
                   <a:solidFill>
                     <a:srgbClr val="000000"/>
                   </a:solidFill>
@@ -3974,7 +3978,7 @@
             </a:ln>
             <a:extLst>
               <a:ext uri="{91240B29-F687-4f45-9708-019B960494DF}">
-                <a14:hiddenLine xmlns="" xmlns:a14="http://schemas.microsoft.com/office/drawing/2010/main" w="9525">
+                <a14:hiddenLine xmlns:a14="http://schemas.microsoft.com/office/drawing/2010/main" xmlns="" w="9525">
                   <a:solidFill>
                     <a:srgbClr val="000000"/>
                   </a:solidFill>
@@ -4094,7 +4098,7 @@
             </a:ln>
             <a:extLst>
               <a:ext uri="{91240B29-F687-4f45-9708-019B960494DF}">
-                <a14:hiddenLine xmlns="" xmlns:a14="http://schemas.microsoft.com/office/drawing/2010/main" w="9525">
+                <a14:hiddenLine xmlns:a14="http://schemas.microsoft.com/office/drawing/2010/main" xmlns="" w="9525">
                   <a:solidFill>
                     <a:srgbClr val="000000"/>
                   </a:solidFill>
@@ -4162,7 +4166,7 @@
             </a:ln>
             <a:extLst>
               <a:ext uri="{91240B29-F687-4f45-9708-019B960494DF}">
-                <a14:hiddenLine xmlns="" xmlns:a14="http://schemas.microsoft.com/office/drawing/2010/main" w="9525">
+                <a14:hiddenLine xmlns:a14="http://schemas.microsoft.com/office/drawing/2010/main" xmlns="" w="9525">
                   <a:solidFill>
                     <a:srgbClr val="000000"/>
                   </a:solidFill>
@@ -4252,7 +4256,7 @@
             </a:ln>
             <a:extLst>
               <a:ext uri="{91240B29-F687-4f45-9708-019B960494DF}">
-                <a14:hiddenLine xmlns="" xmlns:a14="http://schemas.microsoft.com/office/drawing/2010/main" w="9525">
+                <a14:hiddenLine xmlns:a14="http://schemas.microsoft.com/office/drawing/2010/main" xmlns="" w="9525">
                   <a:solidFill>
                     <a:srgbClr val="000000"/>
                   </a:solidFill>
@@ -9059,7 +9063,7 @@
           <a:noFill/>
           <a:extLst>
             <a:ext uri="{909E8E84-426E-40dd-AFC4-6F175D3DCCD1}">
-              <a14:hiddenFill xmlns="" xmlns:a14="http://schemas.microsoft.com/office/drawing/2010/main">
+              <a14:hiddenFill xmlns:a14="http://schemas.microsoft.com/office/drawing/2010/main" xmlns="">
                 <a:solidFill>
                   <a:srgbClr val="FFFFFF"/>
                 </a:solidFill>
@@ -9133,7 +9137,7 @@
               </a:ln>
               <a:extLst>
                 <a:ext uri="{91240B29-F687-4f45-9708-019B960494DF}">
-                  <a14:hiddenLine xmlns="" xmlns:a14="http://schemas.microsoft.com/office/drawing/2010/main" w="9525">
+                  <a14:hiddenLine xmlns:a14="http://schemas.microsoft.com/office/drawing/2010/main" xmlns="" w="9525">
                     <a:solidFill>
                       <a:srgbClr val="000000"/>
                     </a:solidFill>
@@ -9223,7 +9227,7 @@
               </a:ln>
               <a:extLst>
                 <a:ext uri="{91240B29-F687-4f45-9708-019B960494DF}">
-                  <a14:hiddenLine xmlns="" xmlns:a14="http://schemas.microsoft.com/office/drawing/2010/main" w="9525">
+                  <a14:hiddenLine xmlns:a14="http://schemas.microsoft.com/office/drawing/2010/main" xmlns="" w="9525">
                     <a:solidFill>
                       <a:srgbClr val="000000"/>
                     </a:solidFill>
@@ -9313,7 +9317,7 @@
               </a:ln>
               <a:extLst>
                 <a:ext uri="{91240B29-F687-4f45-9708-019B960494DF}">
-                  <a14:hiddenLine xmlns="" xmlns:a14="http://schemas.microsoft.com/office/drawing/2010/main" w="9525">
+                  <a14:hiddenLine xmlns:a14="http://schemas.microsoft.com/office/drawing/2010/main" xmlns="" w="9525">
                     <a:solidFill>
                       <a:srgbClr val="000000"/>
                     </a:solidFill>
@@ -9375,7 +9379,7 @@
               </a:ln>
               <a:extLst>
                 <a:ext uri="{91240B29-F687-4f45-9708-019B960494DF}">
-                  <a14:hiddenLine xmlns="" xmlns:a14="http://schemas.microsoft.com/office/drawing/2010/main" w="9525">
+                  <a14:hiddenLine xmlns:a14="http://schemas.microsoft.com/office/drawing/2010/main" xmlns="" w="9525">
                     <a:solidFill>
                       <a:srgbClr val="000000"/>
                     </a:solidFill>
@@ -9465,7 +9469,7 @@
               </a:ln>
               <a:extLst>
                 <a:ext uri="{91240B29-F687-4f45-9708-019B960494DF}">
-                  <a14:hiddenLine xmlns="" xmlns:a14="http://schemas.microsoft.com/office/drawing/2010/main" w="9525">
+                  <a14:hiddenLine xmlns:a14="http://schemas.microsoft.com/office/drawing/2010/main" xmlns="" w="9525">
                     <a:solidFill>
                       <a:srgbClr val="000000"/>
                     </a:solidFill>
@@ -9527,7 +9531,7 @@
               </a:ln>
               <a:extLst>
                 <a:ext uri="{91240B29-F687-4f45-9708-019B960494DF}">
-                  <a14:hiddenLine xmlns="" xmlns:a14="http://schemas.microsoft.com/office/drawing/2010/main" w="9525">
+                  <a14:hiddenLine xmlns:a14="http://schemas.microsoft.com/office/drawing/2010/main" xmlns="" w="9525">
                     <a:solidFill>
                       <a:srgbClr val="000000"/>
                     </a:solidFill>
@@ -9589,7 +9593,7 @@
               </a:ln>
               <a:extLst>
                 <a:ext uri="{91240B29-F687-4f45-9708-019B960494DF}">
-                  <a14:hiddenLine xmlns="" xmlns:a14="http://schemas.microsoft.com/office/drawing/2010/main" w="9525">
+                  <a14:hiddenLine xmlns:a14="http://schemas.microsoft.com/office/drawing/2010/main" xmlns="" w="9525">
                     <a:solidFill>
                       <a:srgbClr val="000000"/>
                     </a:solidFill>
@@ -9679,7 +9683,7 @@
               </a:ln>
               <a:extLst>
                 <a:ext uri="{91240B29-F687-4f45-9708-019B960494DF}">
-                  <a14:hiddenLine xmlns="" xmlns:a14="http://schemas.microsoft.com/office/drawing/2010/main" w="9525">
+                  <a14:hiddenLine xmlns:a14="http://schemas.microsoft.com/office/drawing/2010/main" xmlns="" w="9525">
                     <a:solidFill>
                       <a:srgbClr val="000000"/>
                     </a:solidFill>
@@ -9769,7 +9773,7 @@
               </a:ln>
               <a:extLst>
                 <a:ext uri="{91240B29-F687-4f45-9708-019B960494DF}">
-                  <a14:hiddenLine xmlns="" xmlns:a14="http://schemas.microsoft.com/office/drawing/2010/main" w="9525">
+                  <a14:hiddenLine xmlns:a14="http://schemas.microsoft.com/office/drawing/2010/main" xmlns="" w="9525">
                     <a:solidFill>
                       <a:srgbClr val="000000"/>
                     </a:solidFill>
@@ -9831,7 +9835,7 @@
               </a:ln>
               <a:extLst>
                 <a:ext uri="{91240B29-F687-4f45-9708-019B960494DF}">
-                  <a14:hiddenLine xmlns="" xmlns:a14="http://schemas.microsoft.com/office/drawing/2010/main" w="9525">
+                  <a14:hiddenLine xmlns:a14="http://schemas.microsoft.com/office/drawing/2010/main" xmlns="" w="9525">
                     <a:solidFill>
                       <a:srgbClr val="000000"/>
                     </a:solidFill>
@@ -9941,7 +9945,7 @@
               </a:ln>
               <a:extLst>
                 <a:ext uri="{91240B29-F687-4f45-9708-019B960494DF}">
-                  <a14:hiddenLine xmlns="" xmlns:a14="http://schemas.microsoft.com/office/drawing/2010/main" w="9525">
+                  <a14:hiddenLine xmlns:a14="http://schemas.microsoft.com/office/drawing/2010/main" xmlns="" w="9525">
                     <a:solidFill>
                       <a:srgbClr val="000000"/>
                     </a:solidFill>
@@ -10025,7 +10029,7 @@
               </a:ln>
               <a:extLst>
                 <a:ext uri="{91240B29-F687-4f45-9708-019B960494DF}">
-                  <a14:hiddenLine xmlns="" xmlns:a14="http://schemas.microsoft.com/office/drawing/2010/main" w="9525">
+                  <a14:hiddenLine xmlns:a14="http://schemas.microsoft.com/office/drawing/2010/main" xmlns="" w="9525">
                     <a:solidFill>
                       <a:srgbClr val="000000"/>
                     </a:solidFill>
@@ -10087,7 +10091,7 @@
               </a:ln>
               <a:extLst>
                 <a:ext uri="{91240B29-F687-4f45-9708-019B960494DF}">
-                  <a14:hiddenLine xmlns="" xmlns:a14="http://schemas.microsoft.com/office/drawing/2010/main" w="9525">
+                  <a14:hiddenLine xmlns:a14="http://schemas.microsoft.com/office/drawing/2010/main" xmlns="" w="9525">
                     <a:solidFill>
                       <a:srgbClr val="000000"/>
                     </a:solidFill>
@@ -10149,7 +10153,7 @@
               </a:ln>
               <a:extLst>
                 <a:ext uri="{91240B29-F687-4f45-9708-019B960494DF}">
-                  <a14:hiddenLine xmlns="" xmlns:a14="http://schemas.microsoft.com/office/drawing/2010/main" w="9525">
+                  <a14:hiddenLine xmlns:a14="http://schemas.microsoft.com/office/drawing/2010/main" xmlns="" w="9525">
                     <a:solidFill>
                       <a:srgbClr val="000000"/>
                     </a:solidFill>
@@ -10239,7 +10243,7 @@
               </a:ln>
               <a:extLst>
                 <a:ext uri="{91240B29-F687-4f45-9708-019B960494DF}">
-                  <a14:hiddenLine xmlns="" xmlns:a14="http://schemas.microsoft.com/office/drawing/2010/main" w="9525">
+                  <a14:hiddenLine xmlns:a14="http://schemas.microsoft.com/office/drawing/2010/main" xmlns="" w="9525">
                     <a:solidFill>
                       <a:srgbClr val="000000"/>
                     </a:solidFill>
@@ -10273,7 +10277,7 @@
               </a:ln>
               <a:extLst>
                 <a:ext uri="{91240B29-F687-4f45-9708-019B960494DF}">
-                  <a14:hiddenLine xmlns="" xmlns:a14="http://schemas.microsoft.com/office/drawing/2010/main" w="9525">
+                  <a14:hiddenLine xmlns:a14="http://schemas.microsoft.com/office/drawing/2010/main" xmlns="" w="9525">
                     <a:solidFill>
                       <a:srgbClr val="000000"/>
                     </a:solidFill>
@@ -10338,7 +10342,7 @@
               </a:ln>
               <a:extLst>
                 <a:ext uri="{91240B29-F687-4f45-9708-019B960494DF}">
-                  <a14:hiddenLine xmlns="" xmlns:a14="http://schemas.microsoft.com/office/drawing/2010/main" w="9525">
+                  <a14:hiddenLine xmlns:a14="http://schemas.microsoft.com/office/drawing/2010/main" xmlns="" w="9525">
                     <a:solidFill>
                       <a:srgbClr val="000000"/>
                     </a:solidFill>
@@ -10428,7 +10432,7 @@
               </a:ln>
               <a:extLst>
                 <a:ext uri="{91240B29-F687-4f45-9708-019B960494DF}">
-                  <a14:hiddenLine xmlns="" xmlns:a14="http://schemas.microsoft.com/office/drawing/2010/main" w="9525">
+                  <a14:hiddenLine xmlns:a14="http://schemas.microsoft.com/office/drawing/2010/main" xmlns="" w="9525">
                     <a:solidFill>
                       <a:srgbClr val="000000"/>
                     </a:solidFill>
@@ -10490,7 +10494,7 @@
               </a:ln>
               <a:extLst>
                 <a:ext uri="{91240B29-F687-4f45-9708-019B960494DF}">
-                  <a14:hiddenLine xmlns="" xmlns:a14="http://schemas.microsoft.com/office/drawing/2010/main" w="9525">
+                  <a14:hiddenLine xmlns:a14="http://schemas.microsoft.com/office/drawing/2010/main" xmlns="" w="9525">
                     <a:solidFill>
                       <a:srgbClr val="000000"/>
                     </a:solidFill>
@@ -10580,7 +10584,7 @@
               </a:ln>
               <a:extLst>
                 <a:ext uri="{91240B29-F687-4f45-9708-019B960494DF}">
-                  <a14:hiddenLine xmlns="" xmlns:a14="http://schemas.microsoft.com/office/drawing/2010/main" w="9525">
+                  <a14:hiddenLine xmlns:a14="http://schemas.microsoft.com/office/drawing/2010/main" xmlns="" w="9525">
                     <a:solidFill>
                       <a:srgbClr val="000000"/>
                     </a:solidFill>
@@ -10645,7 +10649,7 @@
               </a:ln>
               <a:extLst>
                 <a:ext uri="{91240B29-F687-4f45-9708-019B960494DF}">
-                  <a14:hiddenLine xmlns="" xmlns:a14="http://schemas.microsoft.com/office/drawing/2010/main" w="9525">
+                  <a14:hiddenLine xmlns:a14="http://schemas.microsoft.com/office/drawing/2010/main" xmlns="" w="9525">
                     <a:solidFill>
                       <a:srgbClr val="000000"/>
                     </a:solidFill>
@@ -10707,7 +10711,7 @@
               </a:ln>
               <a:extLst>
                 <a:ext uri="{91240B29-F687-4f45-9708-019B960494DF}">
-                  <a14:hiddenLine xmlns="" xmlns:a14="http://schemas.microsoft.com/office/drawing/2010/main" w="9525">
+                  <a14:hiddenLine xmlns:a14="http://schemas.microsoft.com/office/drawing/2010/main" xmlns="" w="9525">
                     <a:solidFill>
                       <a:srgbClr val="000000"/>
                     </a:solidFill>
@@ -10797,7 +10801,7 @@
               </a:ln>
               <a:extLst>
                 <a:ext uri="{91240B29-F687-4f45-9708-019B960494DF}">
-                  <a14:hiddenLine xmlns="" xmlns:a14="http://schemas.microsoft.com/office/drawing/2010/main" w="9525">
+                  <a14:hiddenLine xmlns:a14="http://schemas.microsoft.com/office/drawing/2010/main" xmlns="" w="9525">
                     <a:solidFill>
                       <a:srgbClr val="000000"/>
                     </a:solidFill>
@@ -10887,7 +10891,7 @@
               </a:ln>
               <a:extLst>
                 <a:ext uri="{91240B29-F687-4f45-9708-019B960494DF}">
-                  <a14:hiddenLine xmlns="" xmlns:a14="http://schemas.microsoft.com/office/drawing/2010/main" w="9525">
+                  <a14:hiddenLine xmlns:a14="http://schemas.microsoft.com/office/drawing/2010/main" xmlns="" w="9525">
                     <a:solidFill>
                       <a:srgbClr val="000000"/>
                     </a:solidFill>
@@ -10952,7 +10956,7 @@
               </a:ln>
               <a:extLst>
                 <a:ext uri="{91240B29-F687-4f45-9708-019B960494DF}">
-                  <a14:hiddenLine xmlns="" xmlns:a14="http://schemas.microsoft.com/office/drawing/2010/main" w="9525">
+                  <a14:hiddenLine xmlns:a14="http://schemas.microsoft.com/office/drawing/2010/main" xmlns="" w="9525">
                     <a:solidFill>
                       <a:srgbClr val="000000"/>
                     </a:solidFill>
@@ -11072,7 +11076,7 @@
               </a:ln>
               <a:extLst>
                 <a:ext uri="{91240B29-F687-4f45-9708-019B960494DF}">
-                  <a14:hiddenLine xmlns="" xmlns:a14="http://schemas.microsoft.com/office/drawing/2010/main" w="9525">
+                  <a14:hiddenLine xmlns:a14="http://schemas.microsoft.com/office/drawing/2010/main" xmlns="" w="9525">
                     <a:solidFill>
                       <a:srgbClr val="000000"/>
                     </a:solidFill>
@@ -11170,7 +11174,7 @@
               </a:ln>
               <a:extLst>
                 <a:ext uri="{91240B29-F687-4f45-9708-019B960494DF}">
-                  <a14:hiddenLine xmlns="" xmlns:a14="http://schemas.microsoft.com/office/drawing/2010/main" w="9525">
+                  <a14:hiddenLine xmlns:a14="http://schemas.microsoft.com/office/drawing/2010/main" xmlns="" w="9525">
                     <a:solidFill>
                       <a:srgbClr val="000000"/>
                     </a:solidFill>
@@ -11285,7 +11289,7 @@
               </a:ln>
               <a:extLst>
                 <a:ext uri="{91240B29-F687-4f45-9708-019B960494DF}">
-                  <a14:hiddenLine xmlns="" xmlns:a14="http://schemas.microsoft.com/office/drawing/2010/main" w="9525">
+                  <a14:hiddenLine xmlns:a14="http://schemas.microsoft.com/office/drawing/2010/main" xmlns="" w="9525">
                     <a:solidFill>
                       <a:srgbClr val="000000"/>
                     </a:solidFill>
@@ -11375,7 +11379,7 @@
               </a:ln>
               <a:extLst>
                 <a:ext uri="{91240B29-F687-4f45-9708-019B960494DF}">
-                  <a14:hiddenLine xmlns="" xmlns:a14="http://schemas.microsoft.com/office/drawing/2010/main" w="9525">
+                  <a14:hiddenLine xmlns:a14="http://schemas.microsoft.com/office/drawing/2010/main" xmlns="" w="9525">
                     <a:solidFill>
                       <a:srgbClr val="000000"/>
                     </a:solidFill>
@@ -11440,7 +11444,7 @@
               </a:ln>
               <a:extLst>
                 <a:ext uri="{91240B29-F687-4f45-9708-019B960494DF}">
-                  <a14:hiddenLine xmlns="" xmlns:a14="http://schemas.microsoft.com/office/drawing/2010/main" w="9525">
+                  <a14:hiddenLine xmlns:a14="http://schemas.microsoft.com/office/drawing/2010/main" xmlns="" w="9525">
                     <a:solidFill>
                       <a:srgbClr val="000000"/>
                     </a:solidFill>
@@ -11530,7 +11534,7 @@
               </a:ln>
               <a:extLst>
                 <a:ext uri="{91240B29-F687-4f45-9708-019B960494DF}">
-                  <a14:hiddenLine xmlns="" xmlns:a14="http://schemas.microsoft.com/office/drawing/2010/main" w="9525">
+                  <a14:hiddenLine xmlns:a14="http://schemas.microsoft.com/office/drawing/2010/main" xmlns="" w="9525">
                     <a:solidFill>
                       <a:srgbClr val="000000"/>
                     </a:solidFill>
@@ -11598,7 +11602,7 @@
               </a:ln>
               <a:extLst>
                 <a:ext uri="{91240B29-F687-4f45-9708-019B960494DF}">
-                  <a14:hiddenLine xmlns="" xmlns:a14="http://schemas.microsoft.com/office/drawing/2010/main" w="9525">
+                  <a14:hiddenLine xmlns:a14="http://schemas.microsoft.com/office/drawing/2010/main" xmlns="" w="9525">
                     <a:solidFill>
                       <a:srgbClr val="000000"/>
                     </a:solidFill>
@@ -11688,7 +11692,7 @@
               </a:ln>
               <a:extLst>
                 <a:ext uri="{91240B29-F687-4f45-9708-019B960494DF}">
-                  <a14:hiddenLine xmlns="" xmlns:a14="http://schemas.microsoft.com/office/drawing/2010/main" w="9525">
+                  <a14:hiddenLine xmlns:a14="http://schemas.microsoft.com/office/drawing/2010/main" xmlns="" w="9525">
                     <a:solidFill>
                       <a:srgbClr val="000000"/>
                     </a:solidFill>
@@ -11756,7 +11760,7 @@
               </a:ln>
               <a:extLst>
                 <a:ext uri="{91240B29-F687-4f45-9708-019B960494DF}">
-                  <a14:hiddenLine xmlns="" xmlns:a14="http://schemas.microsoft.com/office/drawing/2010/main" w="9525">
+                  <a14:hiddenLine xmlns:a14="http://schemas.microsoft.com/office/drawing/2010/main" xmlns="" w="9525">
                     <a:solidFill>
                       <a:srgbClr val="000000"/>
                     </a:solidFill>
@@ -11846,7 +11850,7 @@
               </a:ln>
               <a:extLst>
                 <a:ext uri="{91240B29-F687-4f45-9708-019B960494DF}">
-                  <a14:hiddenLine xmlns="" xmlns:a14="http://schemas.microsoft.com/office/drawing/2010/main" w="9525">
+                  <a14:hiddenLine xmlns:a14="http://schemas.microsoft.com/office/drawing/2010/main" xmlns="" w="9525">
                     <a:solidFill>
                       <a:srgbClr val="000000"/>
                     </a:solidFill>
@@ -11880,7 +11884,7 @@
               </a:ln>
               <a:extLst>
                 <a:ext uri="{91240B29-F687-4f45-9708-019B960494DF}">
-                  <a14:hiddenLine xmlns="" xmlns:a14="http://schemas.microsoft.com/office/drawing/2010/main" w="9525">
+                  <a14:hiddenLine xmlns:a14="http://schemas.microsoft.com/office/drawing/2010/main" xmlns="" w="9525">
                     <a:solidFill>
                       <a:srgbClr val="000000"/>
                     </a:solidFill>
@@ -12463,11 +12467,7 @@
             <a:pPr algn="ctr"/>
             <a:r>
               <a:rPr lang="bg-BG" dirty="0" smtClean="0"/>
-              <a:t>Класове и обекти </a:t>
-            </a:r>
-            <a:r>
-              <a:rPr lang="bg-BG" dirty="0" smtClean="0"/>
-              <a:t>в </a:t>
+              <a:t>Класове и обекти в </a:t>
             </a:r>
             <a:r>
               <a:rPr lang="en-US" dirty="0" smtClean="0"/>
@@ -12932,7 +12932,16 @@
           <a:bodyPr/>
           <a:lstStyle/>
           <a:p>
-            <a:endParaRPr lang="en-US"/>
+            <a:pPr algn="ctr"/>
+            <a:r>
+              <a:rPr lang="bg-BG" dirty="0" smtClean="0"/>
+              <a:t>Нива на достъп в </a:t>
+            </a:r>
+            <a:r>
+              <a:rPr lang="en-US" dirty="0" smtClean="0"/>
+              <a:t>java</a:t>
+            </a:r>
+            <a:endParaRPr lang="en-US" dirty="0"/>
           </a:p>
         </p:txBody>
       </p:sp>
@@ -12948,10 +12957,87 @@
         </p:nvSpPr>
         <p:spPr/>
         <p:txBody>
-          <a:bodyPr/>
+          <a:bodyPr>
+            <a:normAutofit fontScale="92500" lnSpcReduction="10000"/>
+          </a:bodyPr>
           <a:lstStyle/>
           <a:p>
-            <a:endParaRPr lang="en-US"/>
+            <a:r>
+              <a:rPr lang="bg-BG" dirty="0" smtClean="0"/>
+              <a:t>Нивата на достъп на елементите на един клас определя дали те да бъдат видими извън класа</a:t>
+            </a:r>
+          </a:p>
+          <a:p>
+            <a:r>
+              <a:rPr lang="bg-BG" dirty="0" smtClean="0"/>
+              <a:t>Нивата на достъп помагат за КАПСУЛАЦИЯТА на данните вътре в обектите </a:t>
+            </a:r>
+          </a:p>
+          <a:p>
+            <a:r>
+              <a:rPr lang="bg-BG" dirty="0" smtClean="0"/>
+              <a:t>В </a:t>
+            </a:r>
+            <a:r>
+              <a:rPr lang="en-US" dirty="0" smtClean="0"/>
+              <a:t>JAVA </a:t>
+            </a:r>
+            <a:r>
+              <a:rPr lang="bg-BG" dirty="0" smtClean="0"/>
+              <a:t>съществуват 3 нива на достъп:</a:t>
+            </a:r>
+          </a:p>
+          <a:p>
+            <a:pPr marL="457200" indent="-457200">
+              <a:buAutoNum type="arabicParenR"/>
+            </a:pPr>
+            <a:r>
+              <a:rPr lang="en-US" dirty="0"/>
+              <a:t>p</a:t>
+            </a:r>
+            <a:r>
+              <a:rPr lang="en-US" dirty="0" smtClean="0"/>
+              <a:t>ublic – </a:t>
+            </a:r>
+            <a:r>
+              <a:rPr lang="bg-BG" dirty="0" smtClean="0"/>
+              <a:t>видим за всички</a:t>
+            </a:r>
+          </a:p>
+          <a:p>
+            <a:pPr marL="457200" indent="-457200">
+              <a:buAutoNum type="arabicParenR"/>
+            </a:pPr>
+            <a:r>
+              <a:rPr lang="en-US" dirty="0" smtClean="0"/>
+              <a:t>protected – </a:t>
+            </a:r>
+            <a:r>
+              <a:rPr lang="bg-BG" dirty="0" smtClean="0"/>
+              <a:t>видим само за наследниците на класа</a:t>
+            </a:r>
+          </a:p>
+          <a:p>
+            <a:pPr marL="457200" indent="-457200">
+              <a:buAutoNum type="arabicParenR"/>
+            </a:pPr>
+            <a:r>
+              <a:rPr lang="en-US" dirty="0" err="1" smtClean="0"/>
+              <a:t>privat</a:t>
+            </a:r>
+            <a:r>
+              <a:rPr lang="bg-BG" dirty="0" smtClean="0"/>
+              <a:t>е</a:t>
+            </a:r>
+            <a:r>
+              <a:rPr lang="en-US" dirty="0" smtClean="0"/>
+              <a:t> </a:t>
+            </a:r>
+            <a:r>
+              <a:rPr lang="bg-BG" dirty="0" smtClean="0"/>
+              <a:t>– видим само в рамките на класа</a:t>
+            </a:r>
+            <a:endParaRPr lang="en-US" dirty="0"/>
           </a:p>
         </p:txBody>
       </p:sp>
@@ -12959,6 +13045,486 @@
     <p:extLst>
       <p:ext uri="{BB962C8B-B14F-4D97-AF65-F5344CB8AC3E}">
         <p14:creationId xmlns:p14="http://schemas.microsoft.com/office/powerpoint/2010/main" val="498412506"/>
+      </p:ext>
+    </p:extLst>
+  </p:cSld>
+  <p:clrMapOvr>
+    <a:masterClrMapping/>
+  </p:clrMapOvr>
+</p:sld>
+</file>
+
+<file path=ppt/slides/slide6.xml><?xml version="1.0" encoding="utf-8"?>
+<p:sld xmlns:a="http://schemas.openxmlformats.org/drawingml/2006/main" xmlns:r="http://schemas.openxmlformats.org/officeDocument/2006/relationships" xmlns:p="http://schemas.openxmlformats.org/presentationml/2006/main">
+  <p:cSld>
+    <p:spTree>
+      <p:nvGrpSpPr>
+        <p:cNvPr id="1" name=""/>
+        <p:cNvGrpSpPr/>
+        <p:nvPr/>
+      </p:nvGrpSpPr>
+      <p:grpSpPr>
+        <a:xfrm>
+          <a:off x="0" y="0"/>
+          <a:ext cx="0" cy="0"/>
+          <a:chOff x="0" y="0"/>
+          <a:chExt cx="0" cy="0"/>
+        </a:xfrm>
+      </p:grpSpPr>
+      <p:sp>
+        <p:nvSpPr>
+          <p:cNvPr id="2" name="Title 1"/>
+          <p:cNvSpPr>
+            <a:spLocks noGrp="1"/>
+          </p:cNvSpPr>
+          <p:nvPr>
+            <p:ph type="title"/>
+          </p:nvPr>
+        </p:nvSpPr>
+        <p:spPr/>
+        <p:txBody>
+          <a:bodyPr/>
+          <a:lstStyle/>
+          <a:p>
+            <a:pPr algn="ctr"/>
+            <a:r>
+              <a:rPr lang="bg-BG" dirty="0"/>
+              <a:t>Нива на достъп в </a:t>
+            </a:r>
+            <a:r>
+              <a:rPr lang="en-US" dirty="0" smtClean="0"/>
+              <a:t>java</a:t>
+            </a:r>
+            <a:r>
+              <a:rPr lang="bg-BG" dirty="0" smtClean="0"/>
+              <a:t> демо</a:t>
+            </a:r>
+            <a:endParaRPr lang="en-US" dirty="0"/>
+          </a:p>
+        </p:txBody>
+      </p:sp>
+      <p:pic>
+        <p:nvPicPr>
+          <p:cNvPr id="1026" name="Picture 2" descr="http://icons.iconarchive.com/icons/arrioch/office-dock/256/Color-MS-Access-icon.png"/>
+          <p:cNvPicPr>
+            <a:picLocks noChangeAspect="1" noChangeArrowheads="1"/>
+          </p:cNvPicPr>
+          <p:nvPr/>
+        </p:nvPicPr>
+        <p:blipFill>
+          <a:blip r:embed="rId2">
+            <a:extLst>
+              <a:ext uri="{28A0092B-C50C-407E-A947-70E740481C1C}">
+                <a14:useLocalDpi xmlns:a14="http://schemas.microsoft.com/office/drawing/2010/main" val="0"/>
+              </a:ext>
+            </a:extLst>
+          </a:blip>
+          <a:srcRect/>
+          <a:stretch>
+            <a:fillRect/>
+          </a:stretch>
+        </p:blipFill>
+        <p:spPr bwMode="auto">
+          <a:xfrm>
+            <a:off x="4042718" y="2097088"/>
+            <a:ext cx="4103387" cy="4103387"/>
+          </a:xfrm>
+          <a:prstGeom prst="rect">
+            <a:avLst/>
+          </a:prstGeom>
+          <a:noFill/>
+          <a:extLst>
+            <a:ext uri="{909E8E84-426E-40DD-AFC4-6F175D3DCCD1}">
+              <a14:hiddenFill xmlns:a14="http://schemas.microsoft.com/office/drawing/2010/main">
+                <a:solidFill>
+                  <a:srgbClr val="FFFFFF"/>
+                </a:solidFill>
+              </a14:hiddenFill>
+            </a:ext>
+          </a:extLst>
+        </p:spPr>
+      </p:pic>
+    </p:spTree>
+    <p:extLst>
+      <p:ext uri="{BB962C8B-B14F-4D97-AF65-F5344CB8AC3E}">
+        <p14:creationId xmlns:p14="http://schemas.microsoft.com/office/powerpoint/2010/main" val="1302462898"/>
+      </p:ext>
+    </p:extLst>
+  </p:cSld>
+  <p:clrMapOvr>
+    <a:masterClrMapping/>
+  </p:clrMapOvr>
+</p:sld>
+</file>
+
+<file path=ppt/slides/slide7.xml><?xml version="1.0" encoding="utf-8"?>
+<p:sld xmlns:a="http://schemas.openxmlformats.org/drawingml/2006/main" xmlns:r="http://schemas.openxmlformats.org/officeDocument/2006/relationships" xmlns:p="http://schemas.openxmlformats.org/presentationml/2006/main">
+  <p:cSld>
+    <p:spTree>
+      <p:nvGrpSpPr>
+        <p:cNvPr id="1" name=""/>
+        <p:cNvGrpSpPr/>
+        <p:nvPr/>
+      </p:nvGrpSpPr>
+      <p:grpSpPr>
+        <a:xfrm>
+          <a:off x="0" y="0"/>
+          <a:ext cx="0" cy="0"/>
+          <a:chOff x="0" y="0"/>
+          <a:chExt cx="0" cy="0"/>
+        </a:xfrm>
+      </p:grpSpPr>
+      <p:sp>
+        <p:nvSpPr>
+          <p:cNvPr id="2" name="Title 1"/>
+          <p:cNvSpPr>
+            <a:spLocks noGrp="1"/>
+          </p:cNvSpPr>
+          <p:nvPr>
+            <p:ph type="title"/>
+          </p:nvPr>
+        </p:nvSpPr>
+        <p:spPr/>
+        <p:txBody>
+          <a:bodyPr/>
+          <a:lstStyle/>
+          <a:p>
+            <a:pPr algn="ctr"/>
+            <a:r>
+              <a:rPr lang="bg-BG" dirty="0" smtClean="0"/>
+              <a:t>Задача</a:t>
+            </a:r>
+            <a:endParaRPr lang="en-US" dirty="0"/>
+          </a:p>
+        </p:txBody>
+      </p:sp>
+      <p:sp>
+        <p:nvSpPr>
+          <p:cNvPr id="3" name="Content Placeholder 2"/>
+          <p:cNvSpPr>
+            <a:spLocks noGrp="1"/>
+          </p:cNvSpPr>
+          <p:nvPr>
+            <p:ph idx="1"/>
+          </p:nvPr>
+        </p:nvSpPr>
+        <p:spPr/>
+        <p:txBody>
+          <a:bodyPr>
+            <a:normAutofit fontScale="92500" lnSpcReduction="10000"/>
+          </a:bodyPr>
+          <a:lstStyle/>
+          <a:p>
+            <a:r>
+              <a:rPr lang="bg-BG" dirty="0" smtClean="0"/>
+              <a:t>Дефинирайте клас </a:t>
+            </a:r>
+            <a:r>
+              <a:rPr lang="en-US" dirty="0" smtClean="0"/>
+              <a:t>Person </a:t>
+            </a:r>
+            <a:r>
+              <a:rPr lang="bg-BG" dirty="0" smtClean="0"/>
+              <a:t>който да има име, години и </a:t>
+            </a:r>
+            <a:r>
+              <a:rPr lang="en-US" dirty="0" smtClean="0"/>
+              <a:t>e-mail. </a:t>
+            </a:r>
+            <a:r>
+              <a:rPr lang="bg-BG" dirty="0" smtClean="0"/>
+              <a:t>Капсулирайте полетата на класа. За валидни данни приемете :</a:t>
+            </a:r>
+          </a:p>
+          <a:p>
+            <a:pPr marL="457200" indent="-457200">
+              <a:buAutoNum type="arabicParenR"/>
+            </a:pPr>
+            <a:r>
+              <a:rPr lang="bg-BG" dirty="0" smtClean="0"/>
+              <a:t>Име - повече от 3 символа</a:t>
+            </a:r>
+          </a:p>
+          <a:p>
+            <a:pPr marL="457200" indent="-457200">
+              <a:buAutoNum type="arabicParenR"/>
+            </a:pPr>
+            <a:r>
+              <a:rPr lang="bg-BG" dirty="0" smtClean="0"/>
+              <a:t>Години – положително число по-малко от 200</a:t>
+            </a:r>
+          </a:p>
+          <a:p>
+            <a:pPr marL="457200" indent="-457200">
+              <a:buAutoNum type="arabicParenR"/>
+            </a:pPr>
+            <a:r>
+              <a:rPr lang="bg-BG" dirty="0"/>
+              <a:t>е</a:t>
+            </a:r>
+            <a:r>
+              <a:rPr lang="bg-BG" dirty="0" smtClean="0"/>
+              <a:t> - </a:t>
+            </a:r>
+            <a:r>
+              <a:rPr lang="en-US" dirty="0" smtClean="0"/>
+              <a:t>mail</a:t>
+            </a:r>
+            <a:r>
+              <a:rPr lang="bg-BG" dirty="0" smtClean="0"/>
+              <a:t> – повече от 3 символа</a:t>
+            </a:r>
+          </a:p>
+          <a:p>
+            <a:pPr marL="0" indent="0">
+              <a:buNone/>
+            </a:pPr>
+            <a:r>
+              <a:rPr lang="bg-BG" dirty="0" smtClean="0"/>
+              <a:t>Дефинирайте функция която извежда в конзолата данните на човека.</a:t>
+            </a:r>
+          </a:p>
+          <a:p>
+            <a:pPr marL="0" indent="0">
+              <a:buNone/>
+            </a:pPr>
+            <a:r>
+              <a:rPr lang="bg-BG" dirty="0" smtClean="0"/>
+              <a:t>Направете 3 обекта от тип </a:t>
+            </a:r>
+            <a:r>
+              <a:rPr lang="en-US" dirty="0" smtClean="0"/>
+              <a:t>Person</a:t>
+            </a:r>
+            <a:r>
+              <a:rPr lang="bg-BG" dirty="0" smtClean="0"/>
+              <a:t> и демонстрирайте функциите на класа.</a:t>
+            </a:r>
+            <a:endParaRPr lang="bg-BG" dirty="0"/>
+          </a:p>
+        </p:txBody>
+      </p:sp>
+    </p:spTree>
+    <p:extLst>
+      <p:ext uri="{BB962C8B-B14F-4D97-AF65-F5344CB8AC3E}">
+        <p14:creationId xmlns:p14="http://schemas.microsoft.com/office/powerpoint/2010/main" val="3475967877"/>
+      </p:ext>
+    </p:extLst>
+  </p:cSld>
+  <p:clrMapOvr>
+    <a:masterClrMapping/>
+  </p:clrMapOvr>
+</p:sld>
+</file>
+
+<file path=ppt/slides/slide8.xml><?xml version="1.0" encoding="utf-8"?>
+<p:sld xmlns:a="http://schemas.openxmlformats.org/drawingml/2006/main" xmlns:r="http://schemas.openxmlformats.org/officeDocument/2006/relationships" xmlns:p="http://schemas.openxmlformats.org/presentationml/2006/main">
+  <p:cSld>
+    <p:spTree>
+      <p:nvGrpSpPr>
+        <p:cNvPr id="1" name=""/>
+        <p:cNvGrpSpPr/>
+        <p:nvPr/>
+      </p:nvGrpSpPr>
+      <p:grpSpPr>
+        <a:xfrm>
+          <a:off x="0" y="0"/>
+          <a:ext cx="0" cy="0"/>
+          <a:chOff x="0" y="0"/>
+          <a:chExt cx="0" cy="0"/>
+        </a:xfrm>
+      </p:grpSpPr>
+      <p:sp>
+        <p:nvSpPr>
+          <p:cNvPr id="2" name="Title 1"/>
+          <p:cNvSpPr>
+            <a:spLocks noGrp="1"/>
+          </p:cNvSpPr>
+          <p:nvPr>
+            <p:ph type="title"/>
+          </p:nvPr>
+        </p:nvSpPr>
+        <p:spPr/>
+        <p:txBody>
+          <a:bodyPr/>
+          <a:lstStyle/>
+          <a:p>
+            <a:pPr algn="ctr"/>
+            <a:r>
+              <a:rPr lang="bg-BG" dirty="0" smtClean="0"/>
+              <a:t>Статични членове на класовете в </a:t>
+            </a:r>
+            <a:r>
+              <a:rPr lang="en-US" dirty="0" smtClean="0"/>
+              <a:t>JAVA</a:t>
+            </a:r>
+            <a:endParaRPr lang="en-US" dirty="0"/>
+          </a:p>
+        </p:txBody>
+      </p:sp>
+      <p:sp>
+        <p:nvSpPr>
+          <p:cNvPr id="3" name="Content Placeholder 2"/>
+          <p:cNvSpPr>
+            <a:spLocks noGrp="1"/>
+          </p:cNvSpPr>
+          <p:nvPr>
+            <p:ph idx="1"/>
+          </p:nvPr>
+        </p:nvSpPr>
+        <p:spPr/>
+        <p:txBody>
+          <a:bodyPr>
+            <a:normAutofit lnSpcReduction="10000"/>
+          </a:bodyPr>
+          <a:lstStyle/>
+          <a:p>
+            <a:r>
+              <a:rPr lang="bg-BG" dirty="0" smtClean="0"/>
+              <a:t>Съдържат ключовата дума </a:t>
+            </a:r>
+            <a:r>
+              <a:rPr lang="en-US" dirty="0" smtClean="0"/>
+              <a:t>static </a:t>
+            </a:r>
+            <a:r>
+              <a:rPr lang="bg-BG" dirty="0" smtClean="0"/>
+              <a:t>в дефиницията си</a:t>
+            </a:r>
+          </a:p>
+          <a:p>
+            <a:r>
+              <a:rPr lang="bg-BG" dirty="0" smtClean="0"/>
+              <a:t>Статични могат да бъдат полета и методи на класа</a:t>
+            </a:r>
+          </a:p>
+          <a:p>
+            <a:r>
+              <a:rPr lang="bg-BG" dirty="0" smtClean="0"/>
+              <a:t>Достъпват се чрез името на класа, а не чрез променливата на </a:t>
+            </a:r>
+            <a:r>
+              <a:rPr lang="bg-BG" dirty="0" err="1" smtClean="0"/>
+              <a:t>инстанцирания</a:t>
+            </a:r>
+            <a:r>
+              <a:rPr lang="bg-BG" dirty="0" smtClean="0"/>
+              <a:t> обект</a:t>
+            </a:r>
+          </a:p>
+          <a:p>
+            <a:r>
+              <a:rPr lang="bg-BG" dirty="0" smtClean="0"/>
+              <a:t>Нямат достъп до не статичните полета и функции на класа</a:t>
+            </a:r>
+          </a:p>
+          <a:p>
+            <a:r>
+              <a:rPr lang="bg-BG" dirty="0" smtClean="0"/>
+              <a:t>Статичните обекти могат се използват без да бъде създавам обект от дадения клас</a:t>
+            </a:r>
+          </a:p>
+        </p:txBody>
+      </p:sp>
+    </p:spTree>
+    <p:extLst>
+      <p:ext uri="{BB962C8B-B14F-4D97-AF65-F5344CB8AC3E}">
+        <p14:creationId xmlns:p14="http://schemas.microsoft.com/office/powerpoint/2010/main" val="1926474472"/>
+      </p:ext>
+    </p:extLst>
+  </p:cSld>
+  <p:clrMapOvr>
+    <a:masterClrMapping/>
+  </p:clrMapOvr>
+</p:sld>
+</file>
+
+<file path=ppt/slides/slide9.xml><?xml version="1.0" encoding="utf-8"?>
+<p:sld xmlns:a="http://schemas.openxmlformats.org/drawingml/2006/main" xmlns:r="http://schemas.openxmlformats.org/officeDocument/2006/relationships" xmlns:p="http://schemas.openxmlformats.org/presentationml/2006/main">
+  <p:cSld>
+    <p:spTree>
+      <p:nvGrpSpPr>
+        <p:cNvPr id="1" name=""/>
+        <p:cNvGrpSpPr/>
+        <p:nvPr/>
+      </p:nvGrpSpPr>
+      <p:grpSpPr>
+        <a:xfrm>
+          <a:off x="0" y="0"/>
+          <a:ext cx="0" cy="0"/>
+          <a:chOff x="0" y="0"/>
+          <a:chExt cx="0" cy="0"/>
+        </a:xfrm>
+      </p:grpSpPr>
+      <p:sp>
+        <p:nvSpPr>
+          <p:cNvPr id="2" name="Title 1"/>
+          <p:cNvSpPr>
+            <a:spLocks noGrp="1"/>
+          </p:cNvSpPr>
+          <p:nvPr>
+            <p:ph type="title"/>
+          </p:nvPr>
+        </p:nvSpPr>
+        <p:spPr/>
+        <p:txBody>
+          <a:bodyPr/>
+          <a:lstStyle/>
+          <a:p>
+            <a:pPr algn="ctr"/>
+            <a:r>
+              <a:rPr lang="bg-BG" dirty="0" smtClean="0"/>
+              <a:t>Статични членове демо</a:t>
+            </a:r>
+            <a:endParaRPr lang="en-US" dirty="0"/>
+          </a:p>
+        </p:txBody>
+      </p:sp>
+      <p:pic>
+        <p:nvPicPr>
+          <p:cNvPr id="5" name="Picture 2" descr="https://m1.behance.net/rendition/modules/64701125/disp/7d30ccd9469d9a994613894200fac8e5.jpg"/>
+          <p:cNvPicPr>
+            <a:picLocks noChangeAspect="1" noChangeArrowheads="1"/>
+          </p:cNvPicPr>
+          <p:nvPr/>
+        </p:nvPicPr>
+        <p:blipFill>
+          <a:blip r:embed="rId2">
+            <a:extLst>
+              <a:ext uri="{28A0092B-C50C-407E-A947-70E740481C1C}">
+                <a14:useLocalDpi xmlns:a14="http://schemas.microsoft.com/office/drawing/2010/main" val="0"/>
+              </a:ext>
+            </a:extLst>
+          </a:blip>
+          <a:srcRect/>
+          <a:stretch>
+            <a:fillRect/>
+          </a:stretch>
+        </p:blipFill>
+        <p:spPr bwMode="auto">
+          <a:xfrm>
+            <a:off x="2261345" y="2097088"/>
+            <a:ext cx="7666133" cy="3194222"/>
+          </a:xfrm>
+          <a:prstGeom prst="rect">
+            <a:avLst/>
+          </a:prstGeom>
+          <a:noFill/>
+          <a:extLst>
+            <a:ext uri="{909E8E84-426E-40DD-AFC4-6F175D3DCCD1}">
+              <a14:hiddenFill xmlns:a14="http://schemas.microsoft.com/office/drawing/2010/main">
+                <a:solidFill>
+                  <a:srgbClr val="FFFFFF"/>
+                </a:solidFill>
+              </a14:hiddenFill>
+            </a:ext>
+          </a:extLst>
+        </p:spPr>
+      </p:pic>
+    </p:spTree>
+    <p:extLst>
+      <p:ext uri="{BB962C8B-B14F-4D97-AF65-F5344CB8AC3E}">
+        <p14:creationId xmlns:p14="http://schemas.microsoft.com/office/powerpoint/2010/main" val="1648223727"/>
       </p:ext>
     </p:extLst>
   </p:cSld>

</xml_diff>

<commit_message>
Finalized OOP presentation and examples
</commit_message>
<xml_diff>
--- a/05.classes-and-object.pptx
+++ b/05.classes-and-object.pptx
@@ -14,6 +14,17 @@
     <p:sldId id="262" r:id="rId8"/>
     <p:sldId id="263" r:id="rId9"/>
     <p:sldId id="264" r:id="rId10"/>
+    <p:sldId id="265" r:id="rId11"/>
+    <p:sldId id="267" r:id="rId12"/>
+    <p:sldId id="266" r:id="rId13"/>
+    <p:sldId id="268" r:id="rId14"/>
+    <p:sldId id="269" r:id="rId15"/>
+    <p:sldId id="271" r:id="rId16"/>
+    <p:sldId id="272" r:id="rId17"/>
+    <p:sldId id="270" r:id="rId18"/>
+    <p:sldId id="273" r:id="rId19"/>
+    <p:sldId id="274" r:id="rId20"/>
+    <p:sldId id="275" r:id="rId21"/>
   </p:sldIdLst>
   <p:sldSz cx="12192000" cy="6858000"/>
   <p:notesSz cx="6858000" cy="9144000"/>
@@ -170,7 +181,7 @@
           <a:noFill/>
           <a:extLst>
             <a:ext uri="{909E8E84-426E-40dd-AFC4-6F175D3DCCD1}">
-              <a14:hiddenFill xmlns:a14="http://schemas.microsoft.com/office/drawing/2010/main" xmlns="">
+              <a14:hiddenFill xmlns="" xmlns:a14="http://schemas.microsoft.com/office/drawing/2010/main">
                 <a:solidFill>
                   <a:srgbClr val="FFFFFF"/>
                 </a:solidFill>
@@ -230,7 +241,7 @@
             </a:ln>
             <a:extLst>
               <a:ext uri="{91240B29-F687-4f45-9708-019B960494DF}">
-                <a14:hiddenLine xmlns:a14="http://schemas.microsoft.com/office/drawing/2010/main" xmlns="" w="9525">
+                <a14:hiddenLine xmlns="" xmlns:a14="http://schemas.microsoft.com/office/drawing/2010/main" w="9525">
                   <a:solidFill>
                     <a:srgbClr val="000000"/>
                   </a:solidFill>
@@ -320,7 +331,7 @@
             </a:ln>
             <a:extLst>
               <a:ext uri="{91240B29-F687-4f45-9708-019B960494DF}">
-                <a14:hiddenLine xmlns:a14="http://schemas.microsoft.com/office/drawing/2010/main" xmlns="" w="9525">
+                <a14:hiddenLine xmlns="" xmlns:a14="http://schemas.microsoft.com/office/drawing/2010/main" w="9525">
                   <a:solidFill>
                     <a:srgbClr val="000000"/>
                   </a:solidFill>
@@ -410,7 +421,7 @@
             </a:ln>
             <a:extLst>
               <a:ext uri="{91240B29-F687-4f45-9708-019B960494DF}">
-                <a14:hiddenLine xmlns:a14="http://schemas.microsoft.com/office/drawing/2010/main" xmlns="" w="9525">
+                <a14:hiddenLine xmlns="" xmlns:a14="http://schemas.microsoft.com/office/drawing/2010/main" w="9525">
                   <a:solidFill>
                     <a:srgbClr val="000000"/>
                   </a:solidFill>
@@ -444,7 +455,7 @@
             </a:ln>
             <a:extLst>
               <a:ext uri="{91240B29-F687-4f45-9708-019B960494DF}">
-                <a14:hiddenLine xmlns:a14="http://schemas.microsoft.com/office/drawing/2010/main" xmlns="" w="9525">
+                <a14:hiddenLine xmlns="" xmlns:a14="http://schemas.microsoft.com/office/drawing/2010/main" w="9525">
                   <a:solidFill>
                     <a:srgbClr val="000000"/>
                   </a:solidFill>
@@ -534,7 +545,7 @@
             </a:ln>
             <a:extLst>
               <a:ext uri="{91240B29-F687-4f45-9708-019B960494DF}">
-                <a14:hiddenLine xmlns:a14="http://schemas.microsoft.com/office/drawing/2010/main" xmlns="" w="9525">
+                <a14:hiddenLine xmlns="" xmlns:a14="http://schemas.microsoft.com/office/drawing/2010/main" w="9525">
                   <a:solidFill>
                     <a:srgbClr val="000000"/>
                   </a:solidFill>
@@ -596,7 +607,7 @@
             </a:ln>
             <a:extLst>
               <a:ext uri="{91240B29-F687-4f45-9708-019B960494DF}">
-                <a14:hiddenLine xmlns:a14="http://schemas.microsoft.com/office/drawing/2010/main" xmlns="" w="9525">
+                <a14:hiddenLine xmlns="" xmlns:a14="http://schemas.microsoft.com/office/drawing/2010/main" w="9525">
                   <a:solidFill>
                     <a:srgbClr val="000000"/>
                   </a:solidFill>
@@ -658,7 +669,7 @@
             </a:ln>
             <a:extLst>
               <a:ext uri="{91240B29-F687-4f45-9708-019B960494DF}">
-                <a14:hiddenLine xmlns:a14="http://schemas.microsoft.com/office/drawing/2010/main" xmlns="" w="9525">
+                <a14:hiddenLine xmlns="" xmlns:a14="http://schemas.microsoft.com/office/drawing/2010/main" w="9525">
                   <a:solidFill>
                     <a:srgbClr val="000000"/>
                   </a:solidFill>
@@ -748,7 +759,7 @@
             </a:ln>
             <a:extLst>
               <a:ext uri="{91240B29-F687-4f45-9708-019B960494DF}">
-                <a14:hiddenLine xmlns:a14="http://schemas.microsoft.com/office/drawing/2010/main" xmlns="" w="9525">
+                <a14:hiddenLine xmlns="" xmlns:a14="http://schemas.microsoft.com/office/drawing/2010/main" w="9525">
                   <a:solidFill>
                     <a:srgbClr val="000000"/>
                   </a:solidFill>
@@ -810,7 +821,7 @@
             </a:ln>
             <a:extLst>
               <a:ext uri="{91240B29-F687-4f45-9708-019B960494DF}">
-                <a14:hiddenLine xmlns:a14="http://schemas.microsoft.com/office/drawing/2010/main" xmlns="" w="9525">
+                <a14:hiddenLine xmlns="" xmlns:a14="http://schemas.microsoft.com/office/drawing/2010/main" w="9525">
                   <a:solidFill>
                     <a:srgbClr val="000000"/>
                   </a:solidFill>
@@ -872,7 +883,7 @@
             </a:ln>
             <a:extLst>
               <a:ext uri="{91240B29-F687-4f45-9708-019B960494DF}">
-                <a14:hiddenLine xmlns:a14="http://schemas.microsoft.com/office/drawing/2010/main" xmlns="" w="9525">
+                <a14:hiddenLine xmlns="" xmlns:a14="http://schemas.microsoft.com/office/drawing/2010/main" w="9525">
                   <a:solidFill>
                     <a:srgbClr val="000000"/>
                   </a:solidFill>
@@ -962,7 +973,7 @@
             </a:ln>
             <a:extLst>
               <a:ext uri="{91240B29-F687-4f45-9708-019B960494DF}">
-                <a14:hiddenLine xmlns:a14="http://schemas.microsoft.com/office/drawing/2010/main" xmlns="" w="9525">
+                <a14:hiddenLine xmlns="" xmlns:a14="http://schemas.microsoft.com/office/drawing/2010/main" w="9525">
                   <a:solidFill>
                     <a:srgbClr val="000000"/>
                   </a:solidFill>
@@ -1052,7 +1063,7 @@
             </a:ln>
             <a:extLst>
               <a:ext uri="{91240B29-F687-4f45-9708-019B960494DF}">
-                <a14:hiddenLine xmlns:a14="http://schemas.microsoft.com/office/drawing/2010/main" xmlns="" w="9525">
+                <a14:hiddenLine xmlns="" xmlns:a14="http://schemas.microsoft.com/office/drawing/2010/main" w="9525">
                   <a:solidFill>
                     <a:srgbClr val="000000"/>
                   </a:solidFill>
@@ -1114,7 +1125,7 @@
             </a:ln>
             <a:extLst>
               <a:ext uri="{91240B29-F687-4f45-9708-019B960494DF}">
-                <a14:hiddenLine xmlns:a14="http://schemas.microsoft.com/office/drawing/2010/main" xmlns="" w="9525">
+                <a14:hiddenLine xmlns="" xmlns:a14="http://schemas.microsoft.com/office/drawing/2010/main" w="9525">
                   <a:solidFill>
                     <a:srgbClr val="000000"/>
                   </a:solidFill>
@@ -1224,7 +1235,7 @@
             </a:ln>
             <a:extLst>
               <a:ext uri="{91240B29-F687-4f45-9708-019B960494DF}">
-                <a14:hiddenLine xmlns:a14="http://schemas.microsoft.com/office/drawing/2010/main" xmlns="" w="9525">
+                <a14:hiddenLine xmlns="" xmlns:a14="http://schemas.microsoft.com/office/drawing/2010/main" w="9525">
                   <a:solidFill>
                     <a:srgbClr val="000000"/>
                   </a:solidFill>
@@ -1286,7 +1297,7 @@
             </a:ln>
             <a:extLst>
               <a:ext uri="{91240B29-F687-4f45-9708-019B960494DF}">
-                <a14:hiddenLine xmlns:a14="http://schemas.microsoft.com/office/drawing/2010/main" xmlns="" w="9525">
+                <a14:hiddenLine xmlns="" xmlns:a14="http://schemas.microsoft.com/office/drawing/2010/main" w="9525">
                   <a:solidFill>
                     <a:srgbClr val="000000"/>
                   </a:solidFill>
@@ -1376,7 +1387,7 @@
             </a:ln>
             <a:extLst>
               <a:ext uri="{91240B29-F687-4f45-9708-019B960494DF}">
-                <a14:hiddenLine xmlns:a14="http://schemas.microsoft.com/office/drawing/2010/main" xmlns="" w="9525">
+                <a14:hiddenLine xmlns="" xmlns:a14="http://schemas.microsoft.com/office/drawing/2010/main" w="9525">
                   <a:solidFill>
                     <a:srgbClr val="000000"/>
                   </a:solidFill>
@@ -1466,7 +1477,7 @@
             </a:ln>
             <a:extLst>
               <a:ext uri="{91240B29-F687-4f45-9708-019B960494DF}">
-                <a14:hiddenLine xmlns:a14="http://schemas.microsoft.com/office/drawing/2010/main" xmlns="" w="9525">
+                <a14:hiddenLine xmlns="" xmlns:a14="http://schemas.microsoft.com/office/drawing/2010/main" w="9525">
                   <a:solidFill>
                     <a:srgbClr val="000000"/>
                   </a:solidFill>
@@ -1528,7 +1539,7 @@
             </a:ln>
             <a:extLst>
               <a:ext uri="{91240B29-F687-4f45-9708-019B960494DF}">
-                <a14:hiddenLine xmlns:a14="http://schemas.microsoft.com/office/drawing/2010/main" xmlns="" w="9525">
+                <a14:hiddenLine xmlns="" xmlns:a14="http://schemas.microsoft.com/office/drawing/2010/main" w="9525">
                   <a:solidFill>
                     <a:srgbClr val="000000"/>
                   </a:solidFill>
@@ -1618,7 +1629,7 @@
             </a:ln>
             <a:extLst>
               <a:ext uri="{91240B29-F687-4f45-9708-019B960494DF}">
-                <a14:hiddenLine xmlns:a14="http://schemas.microsoft.com/office/drawing/2010/main" xmlns="" w="9525">
+                <a14:hiddenLine xmlns="" xmlns:a14="http://schemas.microsoft.com/office/drawing/2010/main" w="9525">
                   <a:solidFill>
                     <a:srgbClr val="000000"/>
                   </a:solidFill>
@@ -1708,7 +1719,7 @@
             </a:ln>
             <a:extLst>
               <a:ext uri="{91240B29-F687-4f45-9708-019B960494DF}">
-                <a14:hiddenLine xmlns:a14="http://schemas.microsoft.com/office/drawing/2010/main" xmlns="" w="9525">
+                <a14:hiddenLine xmlns="" xmlns:a14="http://schemas.microsoft.com/office/drawing/2010/main" w="9525">
                   <a:solidFill>
                     <a:srgbClr val="000000"/>
                   </a:solidFill>
@@ -1764,7 +1775,7 @@
             </a:ln>
             <a:extLst>
               <a:ext uri="{91240B29-F687-4f45-9708-019B960494DF}">
-                <a14:hiddenLine xmlns:a14="http://schemas.microsoft.com/office/drawing/2010/main" xmlns="" w="9525">
+                <a14:hiddenLine xmlns="" xmlns:a14="http://schemas.microsoft.com/office/drawing/2010/main" w="9525">
                   <a:solidFill>
                     <a:srgbClr val="000000"/>
                   </a:solidFill>
@@ -1854,7 +1865,7 @@
             </a:ln>
             <a:extLst>
               <a:ext uri="{91240B29-F687-4f45-9708-019B960494DF}">
-                <a14:hiddenLine xmlns:a14="http://schemas.microsoft.com/office/drawing/2010/main" xmlns="" w="9525">
+                <a14:hiddenLine xmlns="" xmlns:a14="http://schemas.microsoft.com/office/drawing/2010/main" w="9525">
                   <a:solidFill>
                     <a:srgbClr val="000000"/>
                   </a:solidFill>
@@ -1910,7 +1921,7 @@
             </a:ln>
             <a:extLst>
               <a:ext uri="{91240B29-F687-4f45-9708-019B960494DF}">
-                <a14:hiddenLine xmlns:a14="http://schemas.microsoft.com/office/drawing/2010/main" xmlns="" w="9525">
+                <a14:hiddenLine xmlns="" xmlns:a14="http://schemas.microsoft.com/office/drawing/2010/main" w="9525">
                   <a:solidFill>
                     <a:srgbClr val="000000"/>
                   </a:solidFill>
@@ -2000,7 +2011,7 @@
             </a:ln>
             <a:extLst>
               <a:ext uri="{91240B29-F687-4f45-9708-019B960494DF}">
-                <a14:hiddenLine xmlns:a14="http://schemas.microsoft.com/office/drawing/2010/main" xmlns="" w="9525">
+                <a14:hiddenLine xmlns="" xmlns:a14="http://schemas.microsoft.com/office/drawing/2010/main" w="9525">
                   <a:solidFill>
                     <a:srgbClr val="000000"/>
                   </a:solidFill>
@@ -2068,7 +2079,7 @@
             </a:ln>
             <a:extLst>
               <a:ext uri="{91240B29-F687-4f45-9708-019B960494DF}">
-                <a14:hiddenLine xmlns:a14="http://schemas.microsoft.com/office/drawing/2010/main" xmlns="" w="9525">
+                <a14:hiddenLine xmlns="" xmlns:a14="http://schemas.microsoft.com/office/drawing/2010/main" w="9525">
                   <a:solidFill>
                     <a:srgbClr val="000000"/>
                   </a:solidFill>
@@ -2158,7 +2169,7 @@
             </a:ln>
             <a:extLst>
               <a:ext uri="{91240B29-F687-4f45-9708-019B960494DF}">
-                <a14:hiddenLine xmlns:a14="http://schemas.microsoft.com/office/drawing/2010/main" xmlns="" w="9525">
+                <a14:hiddenLine xmlns="" xmlns:a14="http://schemas.microsoft.com/office/drawing/2010/main" w="9525">
                   <a:solidFill>
                     <a:srgbClr val="000000"/>
                   </a:solidFill>
@@ -2226,7 +2237,7 @@
             </a:ln>
             <a:extLst>
               <a:ext uri="{91240B29-F687-4f45-9708-019B960494DF}">
-                <a14:hiddenLine xmlns:a14="http://schemas.microsoft.com/office/drawing/2010/main" xmlns="" w="9525">
+                <a14:hiddenLine xmlns="" xmlns:a14="http://schemas.microsoft.com/office/drawing/2010/main" w="9525">
                   <a:solidFill>
                     <a:srgbClr val="000000"/>
                   </a:solidFill>
@@ -2316,7 +2327,7 @@
             </a:ln>
             <a:extLst>
               <a:ext uri="{91240B29-F687-4f45-9708-019B960494DF}">
-                <a14:hiddenLine xmlns:a14="http://schemas.microsoft.com/office/drawing/2010/main" xmlns="" w="9525">
+                <a14:hiddenLine xmlns="" xmlns:a14="http://schemas.microsoft.com/office/drawing/2010/main" w="9525">
                   <a:solidFill>
                     <a:srgbClr val="000000"/>
                   </a:solidFill>
@@ -2350,7 +2361,7 @@
             </a:ln>
             <a:extLst>
               <a:ext uri="{91240B29-F687-4f45-9708-019B960494DF}">
-                <a14:hiddenLine xmlns:a14="http://schemas.microsoft.com/office/drawing/2010/main" xmlns="" w="9525">
+                <a14:hiddenLine xmlns="" xmlns:a14="http://schemas.microsoft.com/office/drawing/2010/main" w="9525">
                   <a:solidFill>
                     <a:srgbClr val="000000"/>
                   </a:solidFill>
@@ -2440,7 +2451,7 @@
             </a:ln>
             <a:extLst>
               <a:ext uri="{91240B29-F687-4f45-9708-019B960494DF}">
-                <a14:hiddenLine xmlns:a14="http://schemas.microsoft.com/office/drawing/2010/main" xmlns="" w="9525">
+                <a14:hiddenLine xmlns="" xmlns:a14="http://schemas.microsoft.com/office/drawing/2010/main" w="9525">
                   <a:solidFill>
                     <a:srgbClr val="000000"/>
                   </a:solidFill>
@@ -2502,7 +2513,7 @@
             </a:ln>
             <a:extLst>
               <a:ext uri="{91240B29-F687-4f45-9708-019B960494DF}">
-                <a14:hiddenLine xmlns:a14="http://schemas.microsoft.com/office/drawing/2010/main" xmlns="" w="9525">
+                <a14:hiddenLine xmlns="" xmlns:a14="http://schemas.microsoft.com/office/drawing/2010/main" w="9525">
                   <a:solidFill>
                     <a:srgbClr val="000000"/>
                   </a:solidFill>
@@ -2564,7 +2575,7 @@
             </a:ln>
             <a:extLst>
               <a:ext uri="{91240B29-F687-4f45-9708-019B960494DF}">
-                <a14:hiddenLine xmlns:a14="http://schemas.microsoft.com/office/drawing/2010/main" xmlns="" w="9525">
+                <a14:hiddenLine xmlns="" xmlns:a14="http://schemas.microsoft.com/office/drawing/2010/main" w="9525">
                   <a:solidFill>
                     <a:srgbClr val="000000"/>
                   </a:solidFill>
@@ -2654,7 +2665,7 @@
             </a:ln>
             <a:extLst>
               <a:ext uri="{91240B29-F687-4f45-9708-019B960494DF}">
-                <a14:hiddenLine xmlns:a14="http://schemas.microsoft.com/office/drawing/2010/main" xmlns="" w="9525">
+                <a14:hiddenLine xmlns="" xmlns:a14="http://schemas.microsoft.com/office/drawing/2010/main" w="9525">
                   <a:solidFill>
                     <a:srgbClr val="000000"/>
                   </a:solidFill>
@@ -2722,7 +2733,7 @@
             </a:ln>
             <a:extLst>
               <a:ext uri="{91240B29-F687-4f45-9708-019B960494DF}">
-                <a14:hiddenLine xmlns:a14="http://schemas.microsoft.com/office/drawing/2010/main" xmlns="" w="9525">
+                <a14:hiddenLine xmlns="" xmlns:a14="http://schemas.microsoft.com/office/drawing/2010/main" w="9525">
                   <a:solidFill>
                     <a:srgbClr val="000000"/>
                   </a:solidFill>
@@ -2784,7 +2795,7 @@
             </a:ln>
             <a:extLst>
               <a:ext uri="{91240B29-F687-4f45-9708-019B960494DF}">
-                <a14:hiddenLine xmlns:a14="http://schemas.microsoft.com/office/drawing/2010/main" xmlns="" w="9525">
+                <a14:hiddenLine xmlns="" xmlns:a14="http://schemas.microsoft.com/office/drawing/2010/main" w="9525">
                   <a:solidFill>
                     <a:srgbClr val="000000"/>
                   </a:solidFill>
@@ -2874,7 +2885,7 @@
             </a:ln>
             <a:extLst>
               <a:ext uri="{91240B29-F687-4f45-9708-019B960494DF}">
-                <a14:hiddenLine xmlns:a14="http://schemas.microsoft.com/office/drawing/2010/main" xmlns="" w="9525">
+                <a14:hiddenLine xmlns="" xmlns:a14="http://schemas.microsoft.com/office/drawing/2010/main" w="9525">
                   <a:solidFill>
                     <a:srgbClr val="000000"/>
                   </a:solidFill>
@@ -2936,7 +2947,7 @@
             </a:ln>
             <a:extLst>
               <a:ext uri="{91240B29-F687-4f45-9708-019B960494DF}">
-                <a14:hiddenLine xmlns:a14="http://schemas.microsoft.com/office/drawing/2010/main" xmlns="" w="9525">
+                <a14:hiddenLine xmlns="" xmlns:a14="http://schemas.microsoft.com/office/drawing/2010/main" w="9525">
                   <a:solidFill>
                     <a:srgbClr val="000000"/>
                   </a:solidFill>
@@ -3026,7 +3037,7 @@
             </a:ln>
             <a:extLst>
               <a:ext uri="{91240B29-F687-4f45-9708-019B960494DF}">
-                <a14:hiddenLine xmlns:a14="http://schemas.microsoft.com/office/drawing/2010/main" xmlns="" w="9525">
+                <a14:hiddenLine xmlns="" xmlns:a14="http://schemas.microsoft.com/office/drawing/2010/main" w="9525">
                   <a:solidFill>
                     <a:srgbClr val="000000"/>
                   </a:solidFill>
@@ -3088,7 +3099,7 @@
             </a:ln>
             <a:extLst>
               <a:ext uri="{91240B29-F687-4f45-9708-019B960494DF}">
-                <a14:hiddenLine xmlns:a14="http://schemas.microsoft.com/office/drawing/2010/main" xmlns="" w="9525">
+                <a14:hiddenLine xmlns="" xmlns:a14="http://schemas.microsoft.com/office/drawing/2010/main" w="9525">
                   <a:solidFill>
                     <a:srgbClr val="000000"/>
                   </a:solidFill>
@@ -3178,7 +3189,7 @@
             </a:ln>
             <a:extLst>
               <a:ext uri="{91240B29-F687-4f45-9708-019B960494DF}">
-                <a14:hiddenLine xmlns:a14="http://schemas.microsoft.com/office/drawing/2010/main" xmlns="" w="9525">
+                <a14:hiddenLine xmlns="" xmlns:a14="http://schemas.microsoft.com/office/drawing/2010/main" w="9525">
                   <a:solidFill>
                     <a:srgbClr val="000000"/>
                   </a:solidFill>
@@ -3212,7 +3223,7 @@
             </a:ln>
             <a:extLst>
               <a:ext uri="{91240B29-F687-4f45-9708-019B960494DF}">
-                <a14:hiddenLine xmlns:a14="http://schemas.microsoft.com/office/drawing/2010/main" xmlns="" w="9525">
+                <a14:hiddenLine xmlns="" xmlns:a14="http://schemas.microsoft.com/office/drawing/2010/main" w="9525">
                   <a:solidFill>
                     <a:srgbClr val="000000"/>
                   </a:solidFill>
@@ -3277,7 +3288,7 @@
             </a:ln>
             <a:extLst>
               <a:ext uri="{91240B29-F687-4f45-9708-019B960494DF}">
-                <a14:hiddenLine xmlns:a14="http://schemas.microsoft.com/office/drawing/2010/main" xmlns="" w="9525">
+                <a14:hiddenLine xmlns="" xmlns:a14="http://schemas.microsoft.com/office/drawing/2010/main" w="9525">
                   <a:solidFill>
                     <a:srgbClr val="000000"/>
                   </a:solidFill>
@@ -3367,7 +3378,7 @@
             </a:ln>
             <a:extLst>
               <a:ext uri="{91240B29-F687-4f45-9708-019B960494DF}">
-                <a14:hiddenLine xmlns:a14="http://schemas.microsoft.com/office/drawing/2010/main" xmlns="" w="9525">
+                <a14:hiddenLine xmlns="" xmlns:a14="http://schemas.microsoft.com/office/drawing/2010/main" w="9525">
                   <a:solidFill>
                     <a:srgbClr val="000000"/>
                   </a:solidFill>
@@ -3429,7 +3440,7 @@
             </a:ln>
             <a:extLst>
               <a:ext uri="{91240B29-F687-4f45-9708-019B960494DF}">
-                <a14:hiddenLine xmlns:a14="http://schemas.microsoft.com/office/drawing/2010/main" xmlns="" w="9525">
+                <a14:hiddenLine xmlns="" xmlns:a14="http://schemas.microsoft.com/office/drawing/2010/main" w="9525">
                   <a:solidFill>
                     <a:srgbClr val="000000"/>
                   </a:solidFill>
@@ -3519,7 +3530,7 @@
             </a:ln>
             <a:extLst>
               <a:ext uri="{91240B29-F687-4f45-9708-019B960494DF}">
-                <a14:hiddenLine xmlns:a14="http://schemas.microsoft.com/office/drawing/2010/main" xmlns="" w="9525">
+                <a14:hiddenLine xmlns="" xmlns:a14="http://schemas.microsoft.com/office/drawing/2010/main" w="9525">
                   <a:solidFill>
                     <a:srgbClr val="000000"/>
                   </a:solidFill>
@@ -3609,7 +3620,7 @@
             </a:ln>
             <a:extLst>
               <a:ext uri="{91240B29-F687-4f45-9708-019B960494DF}">
-                <a14:hiddenLine xmlns:a14="http://schemas.microsoft.com/office/drawing/2010/main" xmlns="" w="9525">
+                <a14:hiddenLine xmlns="" xmlns:a14="http://schemas.microsoft.com/office/drawing/2010/main" w="9525">
                   <a:solidFill>
                     <a:srgbClr val="000000"/>
                   </a:solidFill>
@@ -3674,7 +3685,7 @@
             </a:ln>
             <a:extLst>
               <a:ext uri="{91240B29-F687-4f45-9708-019B960494DF}">
-                <a14:hiddenLine xmlns:a14="http://schemas.microsoft.com/office/drawing/2010/main" xmlns="" w="9525">
+                <a14:hiddenLine xmlns="" xmlns:a14="http://schemas.microsoft.com/office/drawing/2010/main" w="9525">
                   <a:solidFill>
                     <a:srgbClr val="000000"/>
                   </a:solidFill>
@@ -3736,7 +3747,7 @@
             </a:ln>
             <a:extLst>
               <a:ext uri="{91240B29-F687-4f45-9708-019B960494DF}">
-                <a14:hiddenLine xmlns:a14="http://schemas.microsoft.com/office/drawing/2010/main" xmlns="" w="9525">
+                <a14:hiddenLine xmlns="" xmlns:a14="http://schemas.microsoft.com/office/drawing/2010/main" w="9525">
                   <a:solidFill>
                     <a:srgbClr val="000000"/>
                   </a:solidFill>
@@ -3826,7 +3837,7 @@
             </a:ln>
             <a:extLst>
               <a:ext uri="{91240B29-F687-4f45-9708-019B960494DF}">
-                <a14:hiddenLine xmlns:a14="http://schemas.microsoft.com/office/drawing/2010/main" xmlns="" w="9525">
+                <a14:hiddenLine xmlns="" xmlns:a14="http://schemas.microsoft.com/office/drawing/2010/main" w="9525">
                   <a:solidFill>
                     <a:srgbClr val="000000"/>
                   </a:solidFill>
@@ -3916,7 +3927,7 @@
             </a:ln>
             <a:extLst>
               <a:ext uri="{91240B29-F687-4f45-9708-019B960494DF}">
-                <a14:hiddenLine xmlns:a14="http://schemas.microsoft.com/office/drawing/2010/main" xmlns="" w="9525">
+                <a14:hiddenLine xmlns="" xmlns:a14="http://schemas.microsoft.com/office/drawing/2010/main" w="9525">
                   <a:solidFill>
                     <a:srgbClr val="000000"/>
                   </a:solidFill>
@@ -3978,7 +3989,7 @@
             </a:ln>
             <a:extLst>
               <a:ext uri="{91240B29-F687-4f45-9708-019B960494DF}">
-                <a14:hiddenLine xmlns:a14="http://schemas.microsoft.com/office/drawing/2010/main" xmlns="" w="9525">
+                <a14:hiddenLine xmlns="" xmlns:a14="http://schemas.microsoft.com/office/drawing/2010/main" w="9525">
                   <a:solidFill>
                     <a:srgbClr val="000000"/>
                   </a:solidFill>
@@ -4098,7 +4109,7 @@
             </a:ln>
             <a:extLst>
               <a:ext uri="{91240B29-F687-4f45-9708-019B960494DF}">
-                <a14:hiddenLine xmlns:a14="http://schemas.microsoft.com/office/drawing/2010/main" xmlns="" w="9525">
+                <a14:hiddenLine xmlns="" xmlns:a14="http://schemas.microsoft.com/office/drawing/2010/main" w="9525">
                   <a:solidFill>
                     <a:srgbClr val="000000"/>
                   </a:solidFill>
@@ -4166,7 +4177,7 @@
             </a:ln>
             <a:extLst>
               <a:ext uri="{91240B29-F687-4f45-9708-019B960494DF}">
-                <a14:hiddenLine xmlns:a14="http://schemas.microsoft.com/office/drawing/2010/main" xmlns="" w="9525">
+                <a14:hiddenLine xmlns="" xmlns:a14="http://schemas.microsoft.com/office/drawing/2010/main" w="9525">
                   <a:solidFill>
                     <a:srgbClr val="000000"/>
                   </a:solidFill>
@@ -4256,7 +4267,7 @@
             </a:ln>
             <a:extLst>
               <a:ext uri="{91240B29-F687-4f45-9708-019B960494DF}">
-                <a14:hiddenLine xmlns:a14="http://schemas.microsoft.com/office/drawing/2010/main" xmlns="" w="9525">
+                <a14:hiddenLine xmlns="" xmlns:a14="http://schemas.microsoft.com/office/drawing/2010/main" w="9525">
                   <a:solidFill>
                     <a:srgbClr val="000000"/>
                   </a:solidFill>
@@ -4396,7 +4407,7 @@
           <a:p>
             <a:fld id="{841D4EFB-1649-4F74-89D1-9FCA056B78EF}" type="datetimeFigureOut">
               <a:rPr lang="en-US" smtClean="0"/>
-              <a:t>12/13/2014</a:t>
+              <a:t>12/14/2014</a:t>
             </a:fld>
             <a:endParaRPr lang="en-US"/>
           </a:p>
@@ -4663,7 +4674,7 @@
           <a:p>
             <a:fld id="{841D4EFB-1649-4F74-89D1-9FCA056B78EF}" type="datetimeFigureOut">
               <a:rPr lang="en-US" smtClean="0"/>
-              <a:t>12/13/2014</a:t>
+              <a:t>12/14/2014</a:t>
             </a:fld>
             <a:endParaRPr lang="en-US"/>
           </a:p>
@@ -4859,7 +4870,7 @@
           <a:p>
             <a:fld id="{841D4EFB-1649-4F74-89D1-9FCA056B78EF}" type="datetimeFigureOut">
               <a:rPr lang="en-US" smtClean="0"/>
-              <a:t>12/13/2014</a:t>
+              <a:t>12/14/2014</a:t>
             </a:fld>
             <a:endParaRPr lang="en-US"/>
           </a:p>
@@ -5122,7 +5133,7 @@
           <a:p>
             <a:fld id="{841D4EFB-1649-4F74-89D1-9FCA056B78EF}" type="datetimeFigureOut">
               <a:rPr lang="en-US" smtClean="0"/>
-              <a:t>12/13/2014</a:t>
+              <a:t>12/14/2014</a:t>
             </a:fld>
             <a:endParaRPr lang="en-US"/>
           </a:p>
@@ -5556,7 +5567,7 @@
           <a:p>
             <a:fld id="{841D4EFB-1649-4F74-89D1-9FCA056B78EF}" type="datetimeFigureOut">
               <a:rPr lang="en-US" smtClean="0"/>
-              <a:t>12/13/2014</a:t>
+              <a:t>12/14/2014</a:t>
             </a:fld>
             <a:endParaRPr lang="en-US"/>
           </a:p>
@@ -6102,7 +6113,7 @@
           <a:p>
             <a:fld id="{841D4EFB-1649-4F74-89D1-9FCA056B78EF}" type="datetimeFigureOut">
               <a:rPr lang="en-US" smtClean="0"/>
-              <a:t>12/13/2014</a:t>
+              <a:t>12/14/2014</a:t>
             </a:fld>
             <a:endParaRPr lang="en-US"/>
           </a:p>
@@ -6822,7 +6833,7 @@
           <a:p>
             <a:fld id="{841D4EFB-1649-4F74-89D1-9FCA056B78EF}" type="datetimeFigureOut">
               <a:rPr lang="en-US" smtClean="0"/>
-              <a:t>12/13/2014</a:t>
+              <a:t>12/14/2014</a:t>
             </a:fld>
             <a:endParaRPr lang="en-US"/>
           </a:p>
@@ -6992,7 +7003,7 @@
           <a:p>
             <a:fld id="{841D4EFB-1649-4F74-89D1-9FCA056B78EF}" type="datetimeFigureOut">
               <a:rPr lang="en-US" smtClean="0"/>
-              <a:t>12/13/2014</a:t>
+              <a:t>12/14/2014</a:t>
             </a:fld>
             <a:endParaRPr lang="en-US"/>
           </a:p>
@@ -7172,7 +7183,7 @@
           <a:p>
             <a:fld id="{841D4EFB-1649-4F74-89D1-9FCA056B78EF}" type="datetimeFigureOut">
               <a:rPr lang="en-US" smtClean="0"/>
-              <a:t>12/13/2014</a:t>
+              <a:t>12/14/2014</a:t>
             </a:fld>
             <a:endParaRPr lang="en-US"/>
           </a:p>
@@ -7342,7 +7353,7 @@
           <a:p>
             <a:fld id="{841D4EFB-1649-4F74-89D1-9FCA056B78EF}" type="datetimeFigureOut">
               <a:rPr lang="en-US" smtClean="0"/>
-              <a:t>12/13/2014</a:t>
+              <a:t>12/14/2014</a:t>
             </a:fld>
             <a:endParaRPr lang="en-US"/>
           </a:p>
@@ -7592,7 +7603,7 @@
           <a:p>
             <a:fld id="{841D4EFB-1649-4F74-89D1-9FCA056B78EF}" type="datetimeFigureOut">
               <a:rPr lang="en-US" smtClean="0"/>
-              <a:t>12/13/2014</a:t>
+              <a:t>12/14/2014</a:t>
             </a:fld>
             <a:endParaRPr lang="en-US"/>
           </a:p>
@@ -7824,7 +7835,7 @@
           <a:p>
             <a:fld id="{841D4EFB-1649-4F74-89D1-9FCA056B78EF}" type="datetimeFigureOut">
               <a:rPr lang="en-US" smtClean="0"/>
-              <a:t>12/13/2014</a:t>
+              <a:t>12/14/2014</a:t>
             </a:fld>
             <a:endParaRPr lang="en-US"/>
           </a:p>
@@ -8205,7 +8216,7 @@
           <a:p>
             <a:fld id="{841D4EFB-1649-4F74-89D1-9FCA056B78EF}" type="datetimeFigureOut">
               <a:rPr lang="en-US" smtClean="0"/>
-              <a:t>12/13/2014</a:t>
+              <a:t>12/14/2014</a:t>
             </a:fld>
             <a:endParaRPr lang="en-US"/>
           </a:p>
@@ -8323,7 +8334,7 @@
           <a:p>
             <a:fld id="{841D4EFB-1649-4F74-89D1-9FCA056B78EF}" type="datetimeFigureOut">
               <a:rPr lang="en-US" smtClean="0"/>
-              <a:t>12/13/2014</a:t>
+              <a:t>12/14/2014</a:t>
             </a:fld>
             <a:endParaRPr lang="en-US"/>
           </a:p>
@@ -8418,7 +8429,7 @@
           <a:p>
             <a:fld id="{841D4EFB-1649-4F74-89D1-9FCA056B78EF}" type="datetimeFigureOut">
               <a:rPr lang="en-US" smtClean="0"/>
-              <a:t>12/13/2014</a:t>
+              <a:t>12/14/2014</a:t>
             </a:fld>
             <a:endParaRPr lang="en-US"/>
           </a:p>
@@ -8667,7 +8678,7 @@
           <a:p>
             <a:fld id="{841D4EFB-1649-4F74-89D1-9FCA056B78EF}" type="datetimeFigureOut">
               <a:rPr lang="en-US" smtClean="0"/>
-              <a:t>12/13/2014</a:t>
+              <a:t>12/14/2014</a:t>
             </a:fld>
             <a:endParaRPr lang="en-US"/>
           </a:p>
@@ -8947,7 +8958,7 @@
           <a:p>
             <a:fld id="{841D4EFB-1649-4F74-89D1-9FCA056B78EF}" type="datetimeFigureOut">
               <a:rPr lang="en-US" smtClean="0"/>
-              <a:t>12/13/2014</a:t>
+              <a:t>12/14/2014</a:t>
             </a:fld>
             <a:endParaRPr lang="en-US"/>
           </a:p>
@@ -9063,7 +9074,7 @@
           <a:noFill/>
           <a:extLst>
             <a:ext uri="{909E8E84-426E-40dd-AFC4-6F175D3DCCD1}">
-              <a14:hiddenFill xmlns:a14="http://schemas.microsoft.com/office/drawing/2010/main" xmlns="">
+              <a14:hiddenFill xmlns="" xmlns:a14="http://schemas.microsoft.com/office/drawing/2010/main">
                 <a:solidFill>
                   <a:srgbClr val="FFFFFF"/>
                 </a:solidFill>
@@ -9137,7 +9148,7 @@
               </a:ln>
               <a:extLst>
                 <a:ext uri="{91240B29-F687-4f45-9708-019B960494DF}">
-                  <a14:hiddenLine xmlns:a14="http://schemas.microsoft.com/office/drawing/2010/main" xmlns="" w="9525">
+                  <a14:hiddenLine xmlns="" xmlns:a14="http://schemas.microsoft.com/office/drawing/2010/main" w="9525">
                     <a:solidFill>
                       <a:srgbClr val="000000"/>
                     </a:solidFill>
@@ -9227,7 +9238,7 @@
               </a:ln>
               <a:extLst>
                 <a:ext uri="{91240B29-F687-4f45-9708-019B960494DF}">
-                  <a14:hiddenLine xmlns:a14="http://schemas.microsoft.com/office/drawing/2010/main" xmlns="" w="9525">
+                  <a14:hiddenLine xmlns="" xmlns:a14="http://schemas.microsoft.com/office/drawing/2010/main" w="9525">
                     <a:solidFill>
                       <a:srgbClr val="000000"/>
                     </a:solidFill>
@@ -9317,7 +9328,7 @@
               </a:ln>
               <a:extLst>
                 <a:ext uri="{91240B29-F687-4f45-9708-019B960494DF}">
-                  <a14:hiddenLine xmlns:a14="http://schemas.microsoft.com/office/drawing/2010/main" xmlns="" w="9525">
+                  <a14:hiddenLine xmlns="" xmlns:a14="http://schemas.microsoft.com/office/drawing/2010/main" w="9525">
                     <a:solidFill>
                       <a:srgbClr val="000000"/>
                     </a:solidFill>
@@ -9379,7 +9390,7 @@
               </a:ln>
               <a:extLst>
                 <a:ext uri="{91240B29-F687-4f45-9708-019B960494DF}">
-                  <a14:hiddenLine xmlns:a14="http://schemas.microsoft.com/office/drawing/2010/main" xmlns="" w="9525">
+                  <a14:hiddenLine xmlns="" xmlns:a14="http://schemas.microsoft.com/office/drawing/2010/main" w="9525">
                     <a:solidFill>
                       <a:srgbClr val="000000"/>
                     </a:solidFill>
@@ -9469,7 +9480,7 @@
               </a:ln>
               <a:extLst>
                 <a:ext uri="{91240B29-F687-4f45-9708-019B960494DF}">
-                  <a14:hiddenLine xmlns:a14="http://schemas.microsoft.com/office/drawing/2010/main" xmlns="" w="9525">
+                  <a14:hiddenLine xmlns="" xmlns:a14="http://schemas.microsoft.com/office/drawing/2010/main" w="9525">
                     <a:solidFill>
                       <a:srgbClr val="000000"/>
                     </a:solidFill>
@@ -9531,7 +9542,7 @@
               </a:ln>
               <a:extLst>
                 <a:ext uri="{91240B29-F687-4f45-9708-019B960494DF}">
-                  <a14:hiddenLine xmlns:a14="http://schemas.microsoft.com/office/drawing/2010/main" xmlns="" w="9525">
+                  <a14:hiddenLine xmlns="" xmlns:a14="http://schemas.microsoft.com/office/drawing/2010/main" w="9525">
                     <a:solidFill>
                       <a:srgbClr val="000000"/>
                     </a:solidFill>
@@ -9593,7 +9604,7 @@
               </a:ln>
               <a:extLst>
                 <a:ext uri="{91240B29-F687-4f45-9708-019B960494DF}">
-                  <a14:hiddenLine xmlns:a14="http://schemas.microsoft.com/office/drawing/2010/main" xmlns="" w="9525">
+                  <a14:hiddenLine xmlns="" xmlns:a14="http://schemas.microsoft.com/office/drawing/2010/main" w="9525">
                     <a:solidFill>
                       <a:srgbClr val="000000"/>
                     </a:solidFill>
@@ -9683,7 +9694,7 @@
               </a:ln>
               <a:extLst>
                 <a:ext uri="{91240B29-F687-4f45-9708-019B960494DF}">
-                  <a14:hiddenLine xmlns:a14="http://schemas.microsoft.com/office/drawing/2010/main" xmlns="" w="9525">
+                  <a14:hiddenLine xmlns="" xmlns:a14="http://schemas.microsoft.com/office/drawing/2010/main" w="9525">
                     <a:solidFill>
                       <a:srgbClr val="000000"/>
                     </a:solidFill>
@@ -9773,7 +9784,7 @@
               </a:ln>
               <a:extLst>
                 <a:ext uri="{91240B29-F687-4f45-9708-019B960494DF}">
-                  <a14:hiddenLine xmlns:a14="http://schemas.microsoft.com/office/drawing/2010/main" xmlns="" w="9525">
+                  <a14:hiddenLine xmlns="" xmlns:a14="http://schemas.microsoft.com/office/drawing/2010/main" w="9525">
                     <a:solidFill>
                       <a:srgbClr val="000000"/>
                     </a:solidFill>
@@ -9835,7 +9846,7 @@
               </a:ln>
               <a:extLst>
                 <a:ext uri="{91240B29-F687-4f45-9708-019B960494DF}">
-                  <a14:hiddenLine xmlns:a14="http://schemas.microsoft.com/office/drawing/2010/main" xmlns="" w="9525">
+                  <a14:hiddenLine xmlns="" xmlns:a14="http://schemas.microsoft.com/office/drawing/2010/main" w="9525">
                     <a:solidFill>
                       <a:srgbClr val="000000"/>
                     </a:solidFill>
@@ -9945,7 +9956,7 @@
               </a:ln>
               <a:extLst>
                 <a:ext uri="{91240B29-F687-4f45-9708-019B960494DF}">
-                  <a14:hiddenLine xmlns:a14="http://schemas.microsoft.com/office/drawing/2010/main" xmlns="" w="9525">
+                  <a14:hiddenLine xmlns="" xmlns:a14="http://schemas.microsoft.com/office/drawing/2010/main" w="9525">
                     <a:solidFill>
                       <a:srgbClr val="000000"/>
                     </a:solidFill>
@@ -10029,7 +10040,7 @@
               </a:ln>
               <a:extLst>
                 <a:ext uri="{91240B29-F687-4f45-9708-019B960494DF}">
-                  <a14:hiddenLine xmlns:a14="http://schemas.microsoft.com/office/drawing/2010/main" xmlns="" w="9525">
+                  <a14:hiddenLine xmlns="" xmlns:a14="http://schemas.microsoft.com/office/drawing/2010/main" w="9525">
                     <a:solidFill>
                       <a:srgbClr val="000000"/>
                     </a:solidFill>
@@ -10091,7 +10102,7 @@
               </a:ln>
               <a:extLst>
                 <a:ext uri="{91240B29-F687-4f45-9708-019B960494DF}">
-                  <a14:hiddenLine xmlns:a14="http://schemas.microsoft.com/office/drawing/2010/main" xmlns="" w="9525">
+                  <a14:hiddenLine xmlns="" xmlns:a14="http://schemas.microsoft.com/office/drawing/2010/main" w="9525">
                     <a:solidFill>
                       <a:srgbClr val="000000"/>
                     </a:solidFill>
@@ -10153,7 +10164,7 @@
               </a:ln>
               <a:extLst>
                 <a:ext uri="{91240B29-F687-4f45-9708-019B960494DF}">
-                  <a14:hiddenLine xmlns:a14="http://schemas.microsoft.com/office/drawing/2010/main" xmlns="" w="9525">
+                  <a14:hiddenLine xmlns="" xmlns:a14="http://schemas.microsoft.com/office/drawing/2010/main" w="9525">
                     <a:solidFill>
                       <a:srgbClr val="000000"/>
                     </a:solidFill>
@@ -10243,7 +10254,7 @@
               </a:ln>
               <a:extLst>
                 <a:ext uri="{91240B29-F687-4f45-9708-019B960494DF}">
-                  <a14:hiddenLine xmlns:a14="http://schemas.microsoft.com/office/drawing/2010/main" xmlns="" w="9525">
+                  <a14:hiddenLine xmlns="" xmlns:a14="http://schemas.microsoft.com/office/drawing/2010/main" w="9525">
                     <a:solidFill>
                       <a:srgbClr val="000000"/>
                     </a:solidFill>
@@ -10277,7 +10288,7 @@
               </a:ln>
               <a:extLst>
                 <a:ext uri="{91240B29-F687-4f45-9708-019B960494DF}">
-                  <a14:hiddenLine xmlns:a14="http://schemas.microsoft.com/office/drawing/2010/main" xmlns="" w="9525">
+                  <a14:hiddenLine xmlns="" xmlns:a14="http://schemas.microsoft.com/office/drawing/2010/main" w="9525">
                     <a:solidFill>
                       <a:srgbClr val="000000"/>
                     </a:solidFill>
@@ -10342,7 +10353,7 @@
               </a:ln>
               <a:extLst>
                 <a:ext uri="{91240B29-F687-4f45-9708-019B960494DF}">
-                  <a14:hiddenLine xmlns:a14="http://schemas.microsoft.com/office/drawing/2010/main" xmlns="" w="9525">
+                  <a14:hiddenLine xmlns="" xmlns:a14="http://schemas.microsoft.com/office/drawing/2010/main" w="9525">
                     <a:solidFill>
                       <a:srgbClr val="000000"/>
                     </a:solidFill>
@@ -10432,7 +10443,7 @@
               </a:ln>
               <a:extLst>
                 <a:ext uri="{91240B29-F687-4f45-9708-019B960494DF}">
-                  <a14:hiddenLine xmlns:a14="http://schemas.microsoft.com/office/drawing/2010/main" xmlns="" w="9525">
+                  <a14:hiddenLine xmlns="" xmlns:a14="http://schemas.microsoft.com/office/drawing/2010/main" w="9525">
                     <a:solidFill>
                       <a:srgbClr val="000000"/>
                     </a:solidFill>
@@ -10494,7 +10505,7 @@
               </a:ln>
               <a:extLst>
                 <a:ext uri="{91240B29-F687-4f45-9708-019B960494DF}">
-                  <a14:hiddenLine xmlns:a14="http://schemas.microsoft.com/office/drawing/2010/main" xmlns="" w="9525">
+                  <a14:hiddenLine xmlns="" xmlns:a14="http://schemas.microsoft.com/office/drawing/2010/main" w="9525">
                     <a:solidFill>
                       <a:srgbClr val="000000"/>
                     </a:solidFill>
@@ -10584,7 +10595,7 @@
               </a:ln>
               <a:extLst>
                 <a:ext uri="{91240B29-F687-4f45-9708-019B960494DF}">
-                  <a14:hiddenLine xmlns:a14="http://schemas.microsoft.com/office/drawing/2010/main" xmlns="" w="9525">
+                  <a14:hiddenLine xmlns="" xmlns:a14="http://schemas.microsoft.com/office/drawing/2010/main" w="9525">
                     <a:solidFill>
                       <a:srgbClr val="000000"/>
                     </a:solidFill>
@@ -10649,7 +10660,7 @@
               </a:ln>
               <a:extLst>
                 <a:ext uri="{91240B29-F687-4f45-9708-019B960494DF}">
-                  <a14:hiddenLine xmlns:a14="http://schemas.microsoft.com/office/drawing/2010/main" xmlns="" w="9525">
+                  <a14:hiddenLine xmlns="" xmlns:a14="http://schemas.microsoft.com/office/drawing/2010/main" w="9525">
                     <a:solidFill>
                       <a:srgbClr val="000000"/>
                     </a:solidFill>
@@ -10711,7 +10722,7 @@
               </a:ln>
               <a:extLst>
                 <a:ext uri="{91240B29-F687-4f45-9708-019B960494DF}">
-                  <a14:hiddenLine xmlns:a14="http://schemas.microsoft.com/office/drawing/2010/main" xmlns="" w="9525">
+                  <a14:hiddenLine xmlns="" xmlns:a14="http://schemas.microsoft.com/office/drawing/2010/main" w="9525">
                     <a:solidFill>
                       <a:srgbClr val="000000"/>
                     </a:solidFill>
@@ -10801,7 +10812,7 @@
               </a:ln>
               <a:extLst>
                 <a:ext uri="{91240B29-F687-4f45-9708-019B960494DF}">
-                  <a14:hiddenLine xmlns:a14="http://schemas.microsoft.com/office/drawing/2010/main" xmlns="" w="9525">
+                  <a14:hiddenLine xmlns="" xmlns:a14="http://schemas.microsoft.com/office/drawing/2010/main" w="9525">
                     <a:solidFill>
                       <a:srgbClr val="000000"/>
                     </a:solidFill>
@@ -10891,7 +10902,7 @@
               </a:ln>
               <a:extLst>
                 <a:ext uri="{91240B29-F687-4f45-9708-019B960494DF}">
-                  <a14:hiddenLine xmlns:a14="http://schemas.microsoft.com/office/drawing/2010/main" xmlns="" w="9525">
+                  <a14:hiddenLine xmlns="" xmlns:a14="http://schemas.microsoft.com/office/drawing/2010/main" w="9525">
                     <a:solidFill>
                       <a:srgbClr val="000000"/>
                     </a:solidFill>
@@ -10956,7 +10967,7 @@
               </a:ln>
               <a:extLst>
                 <a:ext uri="{91240B29-F687-4f45-9708-019B960494DF}">
-                  <a14:hiddenLine xmlns:a14="http://schemas.microsoft.com/office/drawing/2010/main" xmlns="" w="9525">
+                  <a14:hiddenLine xmlns="" xmlns:a14="http://schemas.microsoft.com/office/drawing/2010/main" w="9525">
                     <a:solidFill>
                       <a:srgbClr val="000000"/>
                     </a:solidFill>
@@ -11076,7 +11087,7 @@
               </a:ln>
               <a:extLst>
                 <a:ext uri="{91240B29-F687-4f45-9708-019B960494DF}">
-                  <a14:hiddenLine xmlns:a14="http://schemas.microsoft.com/office/drawing/2010/main" xmlns="" w="9525">
+                  <a14:hiddenLine xmlns="" xmlns:a14="http://schemas.microsoft.com/office/drawing/2010/main" w="9525">
                     <a:solidFill>
                       <a:srgbClr val="000000"/>
                     </a:solidFill>
@@ -11174,7 +11185,7 @@
               </a:ln>
               <a:extLst>
                 <a:ext uri="{91240B29-F687-4f45-9708-019B960494DF}">
-                  <a14:hiddenLine xmlns:a14="http://schemas.microsoft.com/office/drawing/2010/main" xmlns="" w="9525">
+                  <a14:hiddenLine xmlns="" xmlns:a14="http://schemas.microsoft.com/office/drawing/2010/main" w="9525">
                     <a:solidFill>
                       <a:srgbClr val="000000"/>
                     </a:solidFill>
@@ -11289,7 +11300,7 @@
               </a:ln>
               <a:extLst>
                 <a:ext uri="{91240B29-F687-4f45-9708-019B960494DF}">
-                  <a14:hiddenLine xmlns:a14="http://schemas.microsoft.com/office/drawing/2010/main" xmlns="" w="9525">
+                  <a14:hiddenLine xmlns="" xmlns:a14="http://schemas.microsoft.com/office/drawing/2010/main" w="9525">
                     <a:solidFill>
                       <a:srgbClr val="000000"/>
                     </a:solidFill>
@@ -11379,7 +11390,7 @@
               </a:ln>
               <a:extLst>
                 <a:ext uri="{91240B29-F687-4f45-9708-019B960494DF}">
-                  <a14:hiddenLine xmlns:a14="http://schemas.microsoft.com/office/drawing/2010/main" xmlns="" w="9525">
+                  <a14:hiddenLine xmlns="" xmlns:a14="http://schemas.microsoft.com/office/drawing/2010/main" w="9525">
                     <a:solidFill>
                       <a:srgbClr val="000000"/>
                     </a:solidFill>
@@ -11444,7 +11455,7 @@
               </a:ln>
               <a:extLst>
                 <a:ext uri="{91240B29-F687-4f45-9708-019B960494DF}">
-                  <a14:hiddenLine xmlns:a14="http://schemas.microsoft.com/office/drawing/2010/main" xmlns="" w="9525">
+                  <a14:hiddenLine xmlns="" xmlns:a14="http://schemas.microsoft.com/office/drawing/2010/main" w="9525">
                     <a:solidFill>
                       <a:srgbClr val="000000"/>
                     </a:solidFill>
@@ -11534,7 +11545,7 @@
               </a:ln>
               <a:extLst>
                 <a:ext uri="{91240B29-F687-4f45-9708-019B960494DF}">
-                  <a14:hiddenLine xmlns:a14="http://schemas.microsoft.com/office/drawing/2010/main" xmlns="" w="9525">
+                  <a14:hiddenLine xmlns="" xmlns:a14="http://schemas.microsoft.com/office/drawing/2010/main" w="9525">
                     <a:solidFill>
                       <a:srgbClr val="000000"/>
                     </a:solidFill>
@@ -11602,7 +11613,7 @@
               </a:ln>
               <a:extLst>
                 <a:ext uri="{91240B29-F687-4f45-9708-019B960494DF}">
-                  <a14:hiddenLine xmlns:a14="http://schemas.microsoft.com/office/drawing/2010/main" xmlns="" w="9525">
+                  <a14:hiddenLine xmlns="" xmlns:a14="http://schemas.microsoft.com/office/drawing/2010/main" w="9525">
                     <a:solidFill>
                       <a:srgbClr val="000000"/>
                     </a:solidFill>
@@ -11692,7 +11703,7 @@
               </a:ln>
               <a:extLst>
                 <a:ext uri="{91240B29-F687-4f45-9708-019B960494DF}">
-                  <a14:hiddenLine xmlns:a14="http://schemas.microsoft.com/office/drawing/2010/main" xmlns="" w="9525">
+                  <a14:hiddenLine xmlns="" xmlns:a14="http://schemas.microsoft.com/office/drawing/2010/main" w="9525">
                     <a:solidFill>
                       <a:srgbClr val="000000"/>
                     </a:solidFill>
@@ -11760,7 +11771,7 @@
               </a:ln>
               <a:extLst>
                 <a:ext uri="{91240B29-F687-4f45-9708-019B960494DF}">
-                  <a14:hiddenLine xmlns:a14="http://schemas.microsoft.com/office/drawing/2010/main" xmlns="" w="9525">
+                  <a14:hiddenLine xmlns="" xmlns:a14="http://schemas.microsoft.com/office/drawing/2010/main" w="9525">
                     <a:solidFill>
                       <a:srgbClr val="000000"/>
                     </a:solidFill>
@@ -11850,7 +11861,7 @@
               </a:ln>
               <a:extLst>
                 <a:ext uri="{91240B29-F687-4f45-9708-019B960494DF}">
-                  <a14:hiddenLine xmlns:a14="http://schemas.microsoft.com/office/drawing/2010/main" xmlns="" w="9525">
+                  <a14:hiddenLine xmlns="" xmlns:a14="http://schemas.microsoft.com/office/drawing/2010/main" w="9525">
                     <a:solidFill>
                       <a:srgbClr val="000000"/>
                     </a:solidFill>
@@ -11884,7 +11895,7 @@
               </a:ln>
               <a:extLst>
                 <a:ext uri="{91240B29-F687-4f45-9708-019B960494DF}">
-                  <a14:hiddenLine xmlns:a14="http://schemas.microsoft.com/office/drawing/2010/main" xmlns="" w="9525">
+                  <a14:hiddenLine xmlns="" xmlns:a14="http://schemas.microsoft.com/office/drawing/2010/main" w="9525">
                     <a:solidFill>
                       <a:srgbClr val="000000"/>
                     </a:solidFill>
@@ -12024,7 +12035,7 @@
           <a:p>
             <a:fld id="{841D4EFB-1649-4F74-89D1-9FCA056B78EF}" type="datetimeFigureOut">
               <a:rPr lang="en-US" smtClean="0"/>
-              <a:t>12/13/2014</a:t>
+              <a:t>12/14/2014</a:t>
             </a:fld>
             <a:endParaRPr lang="en-US"/>
           </a:p>
@@ -12497,6 +12508,1179 @@
 </p:sld>
 </file>
 
+<file path=ppt/slides/slide10.xml><?xml version="1.0" encoding="utf-8"?>
+<p:sld xmlns:a="http://schemas.openxmlformats.org/drawingml/2006/main" xmlns:r="http://schemas.openxmlformats.org/officeDocument/2006/relationships" xmlns:p="http://schemas.openxmlformats.org/presentationml/2006/main">
+  <p:cSld>
+    <p:spTree>
+      <p:nvGrpSpPr>
+        <p:cNvPr id="1" name=""/>
+        <p:cNvGrpSpPr/>
+        <p:nvPr/>
+      </p:nvGrpSpPr>
+      <p:grpSpPr>
+        <a:xfrm>
+          <a:off x="0" y="0"/>
+          <a:ext cx="0" cy="0"/>
+          <a:chOff x="0" y="0"/>
+          <a:chExt cx="0" cy="0"/>
+        </a:xfrm>
+      </p:grpSpPr>
+      <p:sp>
+        <p:nvSpPr>
+          <p:cNvPr id="2" name="Title 1"/>
+          <p:cNvSpPr>
+            <a:spLocks noGrp="1"/>
+          </p:cNvSpPr>
+          <p:nvPr>
+            <p:ph type="title"/>
+          </p:nvPr>
+        </p:nvSpPr>
+        <p:spPr/>
+        <p:txBody>
+          <a:bodyPr/>
+          <a:lstStyle/>
+          <a:p>
+            <a:pPr algn="ctr"/>
+            <a:r>
+              <a:rPr lang="bg-BG" dirty="0" smtClean="0"/>
+              <a:t>Константи в</a:t>
+            </a:r>
+            <a:r>
+              <a:rPr lang="en-US" dirty="0" smtClean="0"/>
+              <a:t> java</a:t>
+            </a:r>
+            <a:endParaRPr lang="en-US" dirty="0"/>
+          </a:p>
+        </p:txBody>
+      </p:sp>
+      <p:sp>
+        <p:nvSpPr>
+          <p:cNvPr id="3" name="Content Placeholder 2"/>
+          <p:cNvSpPr>
+            <a:spLocks noGrp="1"/>
+          </p:cNvSpPr>
+          <p:nvPr>
+            <p:ph idx="1"/>
+          </p:nvPr>
+        </p:nvSpPr>
+        <p:spPr/>
+        <p:txBody>
+          <a:bodyPr/>
+          <a:lstStyle/>
+          <a:p>
+            <a:r>
+              <a:rPr lang="bg-BG" dirty="0" smtClean="0"/>
+              <a:t>Константите в </a:t>
+            </a:r>
+            <a:r>
+              <a:rPr lang="en-US" dirty="0" smtClean="0"/>
+              <a:t>JAVA </a:t>
+            </a:r>
+            <a:r>
+              <a:rPr lang="bg-BG" dirty="0" smtClean="0"/>
+              <a:t>представят променливи чиито стойности не се променят по време на изпълнение на програмата</a:t>
+            </a:r>
+          </a:p>
+          <a:p>
+            <a:r>
+              <a:rPr lang="bg-BG" dirty="0" smtClean="0"/>
+              <a:t>Декларират се с ключовата дума </a:t>
+            </a:r>
+            <a:r>
+              <a:rPr lang="en-US" dirty="0" smtClean="0"/>
+              <a:t>final</a:t>
+            </a:r>
+            <a:endParaRPr lang="bg-BG" dirty="0" smtClean="0"/>
+          </a:p>
+          <a:p>
+            <a:r>
+              <a:rPr lang="bg-BG" dirty="0" smtClean="0"/>
+              <a:t>Могат да бъдат от всякакъв тип</a:t>
+            </a:r>
+            <a:endParaRPr lang="en-US" dirty="0" smtClean="0"/>
+          </a:p>
+          <a:p>
+            <a:endParaRPr lang="en-US" dirty="0"/>
+          </a:p>
+        </p:txBody>
+      </p:sp>
+    </p:spTree>
+    <p:extLst>
+      <p:ext uri="{BB962C8B-B14F-4D97-AF65-F5344CB8AC3E}">
+        <p14:creationId xmlns:p14="http://schemas.microsoft.com/office/powerpoint/2010/main" val="3399226908"/>
+      </p:ext>
+    </p:extLst>
+  </p:cSld>
+  <p:clrMapOvr>
+    <a:masterClrMapping/>
+  </p:clrMapOvr>
+</p:sld>
+</file>
+
+<file path=ppt/slides/slide11.xml><?xml version="1.0" encoding="utf-8"?>
+<p:sld xmlns:a="http://schemas.openxmlformats.org/drawingml/2006/main" xmlns:r="http://schemas.openxmlformats.org/officeDocument/2006/relationships" xmlns:p="http://schemas.openxmlformats.org/presentationml/2006/main">
+  <p:cSld>
+    <p:spTree>
+      <p:nvGrpSpPr>
+        <p:cNvPr id="1" name=""/>
+        <p:cNvGrpSpPr/>
+        <p:nvPr/>
+      </p:nvGrpSpPr>
+      <p:grpSpPr>
+        <a:xfrm>
+          <a:off x="0" y="0"/>
+          <a:ext cx="0" cy="0"/>
+          <a:chOff x="0" y="0"/>
+          <a:chExt cx="0" cy="0"/>
+        </a:xfrm>
+      </p:grpSpPr>
+      <p:sp>
+        <p:nvSpPr>
+          <p:cNvPr id="2" name="Title 1"/>
+          <p:cNvSpPr>
+            <a:spLocks noGrp="1"/>
+          </p:cNvSpPr>
+          <p:nvPr>
+            <p:ph type="title"/>
+          </p:nvPr>
+        </p:nvSpPr>
+        <p:spPr/>
+        <p:txBody>
+          <a:bodyPr/>
+          <a:lstStyle/>
+          <a:p>
+            <a:pPr algn="ctr"/>
+            <a:r>
+              <a:rPr lang="bg-BG" dirty="0"/>
+              <a:t>Константи в</a:t>
+            </a:r>
+            <a:r>
+              <a:rPr lang="en-US" dirty="0"/>
+              <a:t> java</a:t>
+            </a:r>
+          </a:p>
+        </p:txBody>
+      </p:sp>
+      <p:pic>
+        <p:nvPicPr>
+          <p:cNvPr id="1026" name="Picture 2" descr="http://www.ericharshbarger.org/dice/math_constants.jpg"/>
+          <p:cNvPicPr>
+            <a:picLocks noChangeAspect="1" noChangeArrowheads="1"/>
+          </p:cNvPicPr>
+          <p:nvPr/>
+        </p:nvPicPr>
+        <p:blipFill>
+          <a:blip r:embed="rId2">
+            <a:extLst>
+              <a:ext uri="{28A0092B-C50C-407E-A947-70E740481C1C}">
+                <a14:useLocalDpi xmlns:a14="http://schemas.microsoft.com/office/drawing/2010/main" val="0"/>
+              </a:ext>
+            </a:extLst>
+          </a:blip>
+          <a:srcRect/>
+          <a:stretch>
+            <a:fillRect/>
+          </a:stretch>
+        </p:blipFill>
+        <p:spPr bwMode="auto">
+          <a:xfrm>
+            <a:off x="2857183" y="2097088"/>
+            <a:ext cx="6474458" cy="4320188"/>
+          </a:xfrm>
+          <a:prstGeom prst="rect">
+            <a:avLst/>
+          </a:prstGeom>
+          <a:noFill/>
+          <a:extLst>
+            <a:ext uri="{909E8E84-426E-40DD-AFC4-6F175D3DCCD1}">
+              <a14:hiddenFill xmlns:a14="http://schemas.microsoft.com/office/drawing/2010/main">
+                <a:solidFill>
+                  <a:srgbClr val="FFFFFF"/>
+                </a:solidFill>
+              </a14:hiddenFill>
+            </a:ext>
+          </a:extLst>
+        </p:spPr>
+      </p:pic>
+    </p:spTree>
+    <p:extLst>
+      <p:ext uri="{BB962C8B-B14F-4D97-AF65-F5344CB8AC3E}">
+        <p14:creationId xmlns:p14="http://schemas.microsoft.com/office/powerpoint/2010/main" val="3230503773"/>
+      </p:ext>
+    </p:extLst>
+  </p:cSld>
+  <p:clrMapOvr>
+    <a:masterClrMapping/>
+  </p:clrMapOvr>
+</p:sld>
+</file>
+
+<file path=ppt/slides/slide12.xml><?xml version="1.0" encoding="utf-8"?>
+<p:sld xmlns:a="http://schemas.openxmlformats.org/drawingml/2006/main" xmlns:r="http://schemas.openxmlformats.org/officeDocument/2006/relationships" xmlns:p="http://schemas.openxmlformats.org/presentationml/2006/main">
+  <p:cSld>
+    <p:spTree>
+      <p:nvGrpSpPr>
+        <p:cNvPr id="1" name=""/>
+        <p:cNvGrpSpPr/>
+        <p:nvPr/>
+      </p:nvGrpSpPr>
+      <p:grpSpPr>
+        <a:xfrm>
+          <a:off x="0" y="0"/>
+          <a:ext cx="0" cy="0"/>
+          <a:chOff x="0" y="0"/>
+          <a:chExt cx="0" cy="0"/>
+        </a:xfrm>
+      </p:grpSpPr>
+      <p:sp>
+        <p:nvSpPr>
+          <p:cNvPr id="2" name="Title 1"/>
+          <p:cNvSpPr>
+            <a:spLocks noGrp="1"/>
+          </p:cNvSpPr>
+          <p:nvPr>
+            <p:ph type="title"/>
+          </p:nvPr>
+        </p:nvSpPr>
+        <p:spPr/>
+        <p:txBody>
+          <a:bodyPr/>
+          <a:lstStyle/>
+          <a:p>
+            <a:pPr algn="ctr"/>
+            <a:r>
+              <a:rPr lang="bg-BG" dirty="0" smtClean="0"/>
+              <a:t>Наследяване в </a:t>
+            </a:r>
+            <a:r>
+              <a:rPr lang="en-US" dirty="0" smtClean="0"/>
+              <a:t>java</a:t>
+            </a:r>
+            <a:endParaRPr lang="en-US" dirty="0"/>
+          </a:p>
+        </p:txBody>
+      </p:sp>
+      <p:sp>
+        <p:nvSpPr>
+          <p:cNvPr id="3" name="Content Placeholder 2"/>
+          <p:cNvSpPr>
+            <a:spLocks noGrp="1"/>
+          </p:cNvSpPr>
+          <p:nvPr>
+            <p:ph idx="1"/>
+          </p:nvPr>
+        </p:nvSpPr>
+        <p:spPr/>
+        <p:txBody>
+          <a:bodyPr>
+            <a:normAutofit lnSpcReduction="10000"/>
+          </a:bodyPr>
+          <a:lstStyle/>
+          <a:p>
+            <a:r>
+              <a:rPr lang="bg-BG" dirty="0" smtClean="0"/>
+              <a:t>Наследяването е основен принцип на ООП</a:t>
+            </a:r>
+          </a:p>
+          <a:p>
+            <a:r>
+              <a:rPr lang="bg-BG" dirty="0" smtClean="0"/>
+              <a:t>Един клас може да наследява друг клас като по този начин наследникът притежава всички членове на базовия клас</a:t>
+            </a:r>
+          </a:p>
+          <a:p>
+            <a:r>
+              <a:rPr lang="bg-BG" dirty="0" smtClean="0"/>
+              <a:t>Наследяването се използва като няколко вида обекти притежават общи характеристики но не са напълно еднакви</a:t>
+            </a:r>
+          </a:p>
+          <a:p>
+            <a:r>
+              <a:rPr lang="bg-BG" dirty="0" smtClean="0"/>
+              <a:t>В </a:t>
+            </a:r>
+            <a:r>
+              <a:rPr lang="en-US" dirty="0" smtClean="0"/>
+              <a:t>JAVA </a:t>
+            </a:r>
+            <a:r>
+              <a:rPr lang="bg-BG" dirty="0" smtClean="0"/>
+              <a:t>един клас може да има само един базов клас</a:t>
+            </a:r>
+          </a:p>
+          <a:p>
+            <a:r>
+              <a:rPr lang="bg-BG" dirty="0" smtClean="0"/>
+              <a:t>Членовете на класа които са </a:t>
+            </a:r>
+            <a:r>
+              <a:rPr lang="en-US" dirty="0" smtClean="0"/>
+              <a:t>protected </a:t>
+            </a:r>
+            <a:r>
+              <a:rPr lang="bg-BG" dirty="0" smtClean="0"/>
+              <a:t>се виждат от наследниците</a:t>
+            </a:r>
+            <a:endParaRPr lang="en-US" dirty="0"/>
+          </a:p>
+        </p:txBody>
+      </p:sp>
+    </p:spTree>
+    <p:extLst>
+      <p:ext uri="{BB962C8B-B14F-4D97-AF65-F5344CB8AC3E}">
+        <p14:creationId xmlns:p14="http://schemas.microsoft.com/office/powerpoint/2010/main" val="410988642"/>
+      </p:ext>
+    </p:extLst>
+  </p:cSld>
+  <p:clrMapOvr>
+    <a:masterClrMapping/>
+  </p:clrMapOvr>
+</p:sld>
+</file>
+
+<file path=ppt/slides/slide13.xml><?xml version="1.0" encoding="utf-8"?>
+<p:sld xmlns:a="http://schemas.openxmlformats.org/drawingml/2006/main" xmlns:r="http://schemas.openxmlformats.org/officeDocument/2006/relationships" xmlns:p="http://schemas.openxmlformats.org/presentationml/2006/main">
+  <p:cSld>
+    <p:spTree>
+      <p:nvGrpSpPr>
+        <p:cNvPr id="1" name=""/>
+        <p:cNvGrpSpPr/>
+        <p:nvPr/>
+      </p:nvGrpSpPr>
+      <p:grpSpPr>
+        <a:xfrm>
+          <a:off x="0" y="0"/>
+          <a:ext cx="0" cy="0"/>
+          <a:chOff x="0" y="0"/>
+          <a:chExt cx="0" cy="0"/>
+        </a:xfrm>
+      </p:grpSpPr>
+      <p:sp>
+        <p:nvSpPr>
+          <p:cNvPr id="2" name="Title 1"/>
+          <p:cNvSpPr>
+            <a:spLocks noGrp="1"/>
+          </p:cNvSpPr>
+          <p:nvPr>
+            <p:ph type="title"/>
+          </p:nvPr>
+        </p:nvSpPr>
+        <p:spPr/>
+        <p:txBody>
+          <a:bodyPr/>
+          <a:lstStyle/>
+          <a:p>
+            <a:pPr algn="ctr"/>
+            <a:r>
+              <a:rPr lang="bg-BG" dirty="0"/>
+              <a:t>Наследяване в </a:t>
+            </a:r>
+            <a:r>
+              <a:rPr lang="en-US" dirty="0"/>
+              <a:t>java</a:t>
+            </a:r>
+          </a:p>
+        </p:txBody>
+      </p:sp>
+      <p:pic>
+        <p:nvPicPr>
+          <p:cNvPr id="2050" name="Picture 2" descr="https://docs.oracle.com/javase/tutorial/figures/java/concepts-bikeHierarchy.gif"/>
+          <p:cNvPicPr>
+            <a:picLocks noChangeAspect="1" noChangeArrowheads="1"/>
+          </p:cNvPicPr>
+          <p:nvPr/>
+        </p:nvPicPr>
+        <p:blipFill>
+          <a:blip r:embed="rId2">
+            <a:extLst>
+              <a:ext uri="{28A0092B-C50C-407E-A947-70E740481C1C}">
+                <a14:useLocalDpi xmlns:a14="http://schemas.microsoft.com/office/drawing/2010/main" val="0"/>
+              </a:ext>
+            </a:extLst>
+          </a:blip>
+          <a:srcRect/>
+          <a:stretch>
+            <a:fillRect/>
+          </a:stretch>
+        </p:blipFill>
+        <p:spPr bwMode="auto">
+          <a:xfrm>
+            <a:off x="3779107" y="2097088"/>
+            <a:ext cx="4630609" cy="4011545"/>
+          </a:xfrm>
+          <a:prstGeom prst="rect">
+            <a:avLst/>
+          </a:prstGeom>
+          <a:noFill/>
+          <a:extLst>
+            <a:ext uri="{909E8E84-426E-40DD-AFC4-6F175D3DCCD1}">
+              <a14:hiddenFill xmlns:a14="http://schemas.microsoft.com/office/drawing/2010/main">
+                <a:solidFill>
+                  <a:srgbClr val="FFFFFF"/>
+                </a:solidFill>
+              </a14:hiddenFill>
+            </a:ext>
+          </a:extLst>
+        </p:spPr>
+      </p:pic>
+    </p:spTree>
+    <p:extLst>
+      <p:ext uri="{BB962C8B-B14F-4D97-AF65-F5344CB8AC3E}">
+        <p14:creationId xmlns:p14="http://schemas.microsoft.com/office/powerpoint/2010/main" val="657755149"/>
+      </p:ext>
+    </p:extLst>
+  </p:cSld>
+  <p:clrMapOvr>
+    <a:masterClrMapping/>
+  </p:clrMapOvr>
+</p:sld>
+</file>
+
+<file path=ppt/slides/slide14.xml><?xml version="1.0" encoding="utf-8"?>
+<p:sld xmlns:a="http://schemas.openxmlformats.org/drawingml/2006/main" xmlns:r="http://schemas.openxmlformats.org/officeDocument/2006/relationships" xmlns:p="http://schemas.openxmlformats.org/presentationml/2006/main">
+  <p:cSld>
+    <p:spTree>
+      <p:nvGrpSpPr>
+        <p:cNvPr id="1" name=""/>
+        <p:cNvGrpSpPr/>
+        <p:nvPr/>
+      </p:nvGrpSpPr>
+      <p:grpSpPr>
+        <a:xfrm>
+          <a:off x="0" y="0"/>
+          <a:ext cx="0" cy="0"/>
+          <a:chOff x="0" y="0"/>
+          <a:chExt cx="0" cy="0"/>
+        </a:xfrm>
+      </p:grpSpPr>
+      <p:sp>
+        <p:nvSpPr>
+          <p:cNvPr id="2" name="Title 1"/>
+          <p:cNvSpPr>
+            <a:spLocks noGrp="1"/>
+          </p:cNvSpPr>
+          <p:nvPr>
+            <p:ph type="title"/>
+          </p:nvPr>
+        </p:nvSpPr>
+        <p:spPr/>
+        <p:txBody>
+          <a:bodyPr/>
+          <a:lstStyle/>
+          <a:p>
+            <a:pPr algn="ctr"/>
+            <a:r>
+              <a:rPr lang="bg-BG" dirty="0" err="1" smtClean="0"/>
+              <a:t>ЗАдача</a:t>
+            </a:r>
+            <a:endParaRPr lang="en-US" dirty="0"/>
+          </a:p>
+        </p:txBody>
+      </p:sp>
+      <p:sp>
+        <p:nvSpPr>
+          <p:cNvPr id="3" name="Content Placeholder 2"/>
+          <p:cNvSpPr>
+            <a:spLocks noGrp="1"/>
+          </p:cNvSpPr>
+          <p:nvPr>
+            <p:ph idx="1"/>
+          </p:nvPr>
+        </p:nvSpPr>
+        <p:spPr/>
+        <p:txBody>
+          <a:bodyPr>
+            <a:normAutofit fontScale="92500" lnSpcReduction="10000"/>
+          </a:bodyPr>
+          <a:lstStyle/>
+          <a:p>
+            <a:r>
+              <a:rPr lang="bg-BG" dirty="0" smtClean="0"/>
+              <a:t>Направете клас </a:t>
+            </a:r>
+            <a:r>
+              <a:rPr lang="en-US" dirty="0" smtClean="0"/>
+              <a:t>Employee </a:t>
+            </a:r>
+            <a:r>
+              <a:rPr lang="bg-BG" dirty="0" smtClean="0"/>
+              <a:t>който съдържа базовите характеристики за един работник: часове работа на месец и месечна заплата</a:t>
+            </a:r>
+          </a:p>
+          <a:p>
+            <a:r>
+              <a:rPr lang="bg-BG" dirty="0" smtClean="0"/>
+              <a:t>Направете клас </a:t>
+            </a:r>
+            <a:r>
+              <a:rPr lang="en-US" dirty="0" smtClean="0"/>
+              <a:t>Police</a:t>
+            </a:r>
+            <a:r>
+              <a:rPr lang="en-US" dirty="0"/>
+              <a:t>m</a:t>
+            </a:r>
+            <a:r>
+              <a:rPr lang="en-US" dirty="0" smtClean="0"/>
+              <a:t>an, </a:t>
+            </a:r>
+            <a:r>
+              <a:rPr lang="bg-BG" dirty="0" smtClean="0"/>
+              <a:t>който наследява </a:t>
+            </a:r>
+            <a:r>
+              <a:rPr lang="en-US" dirty="0" smtClean="0"/>
+              <a:t>Employee </a:t>
+            </a:r>
+            <a:r>
+              <a:rPr lang="bg-BG" dirty="0" smtClean="0"/>
+              <a:t>и добавя поле за полицейския </a:t>
+            </a:r>
+            <a:r>
+              <a:rPr lang="bg-BG" dirty="0" err="1" smtClean="0"/>
+              <a:t>ранк</a:t>
+            </a:r>
+            <a:r>
+              <a:rPr lang="bg-BG" dirty="0" smtClean="0"/>
+              <a:t> на дадения полицай</a:t>
+            </a:r>
+          </a:p>
+          <a:p>
+            <a:r>
+              <a:rPr lang="bg-BG" dirty="0" smtClean="0"/>
+              <a:t>Направете клас </a:t>
+            </a:r>
+            <a:r>
+              <a:rPr lang="en-US" dirty="0" smtClean="0"/>
+              <a:t>Doctor</a:t>
+            </a:r>
+            <a:r>
+              <a:rPr lang="bg-BG" dirty="0" smtClean="0"/>
+              <a:t>, който наследява </a:t>
+            </a:r>
+            <a:r>
+              <a:rPr lang="en-US" dirty="0" smtClean="0"/>
+              <a:t>Employee </a:t>
+            </a:r>
+            <a:r>
+              <a:rPr lang="bg-BG" dirty="0" smtClean="0"/>
+              <a:t>и добавя полета за броя нощни и броя целодневни дежурства на месец</a:t>
+            </a:r>
+          </a:p>
+          <a:p>
+            <a:r>
+              <a:rPr lang="bg-BG" dirty="0" smtClean="0"/>
+              <a:t>Направете нужните </a:t>
+            </a:r>
+            <a:r>
+              <a:rPr lang="en-US" dirty="0" smtClean="0"/>
+              <a:t>get/set </a:t>
+            </a:r>
+            <a:r>
+              <a:rPr lang="bg-BG" dirty="0" smtClean="0"/>
+              <a:t>методи както и методи за извеждане на информацията за обектите в конзолата</a:t>
+            </a:r>
+            <a:endParaRPr lang="en-US" dirty="0"/>
+          </a:p>
+        </p:txBody>
+      </p:sp>
+    </p:spTree>
+    <p:extLst>
+      <p:ext uri="{BB962C8B-B14F-4D97-AF65-F5344CB8AC3E}">
+        <p14:creationId xmlns:p14="http://schemas.microsoft.com/office/powerpoint/2010/main" val="2497751325"/>
+      </p:ext>
+    </p:extLst>
+  </p:cSld>
+  <p:clrMapOvr>
+    <a:masterClrMapping/>
+  </p:clrMapOvr>
+</p:sld>
+</file>
+
+<file path=ppt/slides/slide15.xml><?xml version="1.0" encoding="utf-8"?>
+<p:sld xmlns:a="http://schemas.openxmlformats.org/drawingml/2006/main" xmlns:r="http://schemas.openxmlformats.org/officeDocument/2006/relationships" xmlns:p="http://schemas.openxmlformats.org/presentationml/2006/main">
+  <p:cSld>
+    <p:spTree>
+      <p:nvGrpSpPr>
+        <p:cNvPr id="1" name=""/>
+        <p:cNvGrpSpPr/>
+        <p:nvPr/>
+      </p:nvGrpSpPr>
+      <p:grpSpPr>
+        <a:xfrm>
+          <a:off x="0" y="0"/>
+          <a:ext cx="0" cy="0"/>
+          <a:chOff x="0" y="0"/>
+          <a:chExt cx="0" cy="0"/>
+        </a:xfrm>
+      </p:grpSpPr>
+      <p:sp>
+        <p:nvSpPr>
+          <p:cNvPr id="2" name="Title 1"/>
+          <p:cNvSpPr>
+            <a:spLocks noGrp="1"/>
+          </p:cNvSpPr>
+          <p:nvPr>
+            <p:ph type="title"/>
+          </p:nvPr>
+        </p:nvSpPr>
+        <p:spPr/>
+        <p:txBody>
+          <a:bodyPr/>
+          <a:lstStyle/>
+          <a:p>
+            <a:pPr algn="ctr"/>
+            <a:r>
+              <a:rPr lang="bg-BG" dirty="0" smtClean="0"/>
+              <a:t>Абстрактни класове и методи</a:t>
+            </a:r>
+            <a:endParaRPr lang="en-US" dirty="0"/>
+          </a:p>
+        </p:txBody>
+      </p:sp>
+      <p:sp>
+        <p:nvSpPr>
+          <p:cNvPr id="3" name="Content Placeholder 2"/>
+          <p:cNvSpPr>
+            <a:spLocks noGrp="1"/>
+          </p:cNvSpPr>
+          <p:nvPr>
+            <p:ph idx="1"/>
+          </p:nvPr>
+        </p:nvSpPr>
+        <p:spPr/>
+        <p:txBody>
+          <a:bodyPr>
+            <a:normAutofit lnSpcReduction="10000"/>
+          </a:bodyPr>
+          <a:lstStyle/>
+          <a:p>
+            <a:r>
+              <a:rPr lang="bg-BG" dirty="0" smtClean="0"/>
+              <a:t>Абстрактните класове представляват класове от които не може да се направи инстанция (обект)</a:t>
+            </a:r>
+          </a:p>
+          <a:p>
+            <a:r>
+              <a:rPr lang="bg-BG" dirty="0" smtClean="0"/>
+              <a:t>Използват се за да се наследят от други класове</a:t>
+            </a:r>
+          </a:p>
+          <a:p>
+            <a:r>
+              <a:rPr lang="bg-BG" dirty="0" smtClean="0"/>
+              <a:t>Абстрактен метод представлява метод който няма тяло</a:t>
+            </a:r>
+          </a:p>
+          <a:p>
+            <a:r>
+              <a:rPr lang="bg-BG" dirty="0" smtClean="0"/>
+              <a:t>Абстрактните методи трябва да бъдат имплементирани от класовете </a:t>
+            </a:r>
+            <a:r>
+              <a:rPr lang="bg-BG" dirty="0" err="1" smtClean="0"/>
+              <a:t>наледници</a:t>
+            </a:r>
+            <a:endParaRPr lang="bg-BG" dirty="0" smtClean="0"/>
+          </a:p>
+          <a:p>
+            <a:r>
+              <a:rPr lang="bg-BG" dirty="0" smtClean="0"/>
+              <a:t>Абстрактни методи могат да имат само абстрактните класове</a:t>
+            </a:r>
+            <a:endParaRPr lang="en-US" dirty="0"/>
+          </a:p>
+        </p:txBody>
+      </p:sp>
+    </p:spTree>
+    <p:extLst>
+      <p:ext uri="{BB962C8B-B14F-4D97-AF65-F5344CB8AC3E}">
+        <p14:creationId xmlns:p14="http://schemas.microsoft.com/office/powerpoint/2010/main" val="2860306016"/>
+      </p:ext>
+    </p:extLst>
+  </p:cSld>
+  <p:clrMapOvr>
+    <a:masterClrMapping/>
+  </p:clrMapOvr>
+</p:sld>
+</file>
+
+<file path=ppt/slides/slide16.xml><?xml version="1.0" encoding="utf-8"?>
+<p:sld xmlns:a="http://schemas.openxmlformats.org/drawingml/2006/main" xmlns:r="http://schemas.openxmlformats.org/officeDocument/2006/relationships" xmlns:p="http://schemas.openxmlformats.org/presentationml/2006/main">
+  <p:cSld>
+    <p:spTree>
+      <p:nvGrpSpPr>
+        <p:cNvPr id="1" name=""/>
+        <p:cNvGrpSpPr/>
+        <p:nvPr/>
+      </p:nvGrpSpPr>
+      <p:grpSpPr>
+        <a:xfrm>
+          <a:off x="0" y="0"/>
+          <a:ext cx="0" cy="0"/>
+          <a:chOff x="0" y="0"/>
+          <a:chExt cx="0" cy="0"/>
+        </a:xfrm>
+      </p:grpSpPr>
+      <p:sp>
+        <p:nvSpPr>
+          <p:cNvPr id="2" name="Title 1"/>
+          <p:cNvSpPr>
+            <a:spLocks noGrp="1"/>
+          </p:cNvSpPr>
+          <p:nvPr>
+            <p:ph type="title"/>
+          </p:nvPr>
+        </p:nvSpPr>
+        <p:spPr/>
+        <p:txBody>
+          <a:bodyPr/>
+          <a:lstStyle/>
+          <a:p>
+            <a:pPr algn="ctr"/>
+            <a:r>
+              <a:rPr lang="bg-BG" dirty="0"/>
+              <a:t>Абстрактни класове и </a:t>
+            </a:r>
+            <a:r>
+              <a:rPr lang="bg-BG" dirty="0" smtClean="0"/>
+              <a:t>методи демо</a:t>
+            </a:r>
+            <a:endParaRPr lang="en-US" dirty="0"/>
+          </a:p>
+        </p:txBody>
+      </p:sp>
+      <p:pic>
+        <p:nvPicPr>
+          <p:cNvPr id="3074" name="Picture 2" descr="http://i.stack.imgur.com/gXREq.png"/>
+          <p:cNvPicPr>
+            <a:picLocks noChangeAspect="1" noChangeArrowheads="1"/>
+          </p:cNvPicPr>
+          <p:nvPr/>
+        </p:nvPicPr>
+        <p:blipFill>
+          <a:blip r:embed="rId2">
+            <a:extLst>
+              <a:ext uri="{28A0092B-C50C-407E-A947-70E740481C1C}">
+                <a14:useLocalDpi xmlns:a14="http://schemas.microsoft.com/office/drawing/2010/main" val="0"/>
+              </a:ext>
+            </a:extLst>
+          </a:blip>
+          <a:srcRect/>
+          <a:stretch>
+            <a:fillRect/>
+          </a:stretch>
+        </p:blipFill>
+        <p:spPr bwMode="auto">
+          <a:xfrm>
+            <a:off x="2259226" y="2097088"/>
+            <a:ext cx="7670371" cy="4104599"/>
+          </a:xfrm>
+          <a:prstGeom prst="rect">
+            <a:avLst/>
+          </a:prstGeom>
+          <a:noFill/>
+          <a:extLst>
+            <a:ext uri="{909E8E84-426E-40DD-AFC4-6F175D3DCCD1}">
+              <a14:hiddenFill xmlns:a14="http://schemas.microsoft.com/office/drawing/2010/main">
+                <a:solidFill>
+                  <a:srgbClr val="FFFFFF"/>
+                </a:solidFill>
+              </a14:hiddenFill>
+            </a:ext>
+          </a:extLst>
+        </p:spPr>
+      </p:pic>
+    </p:spTree>
+    <p:extLst>
+      <p:ext uri="{BB962C8B-B14F-4D97-AF65-F5344CB8AC3E}">
+        <p14:creationId xmlns:p14="http://schemas.microsoft.com/office/powerpoint/2010/main" val="3060016015"/>
+      </p:ext>
+    </p:extLst>
+  </p:cSld>
+  <p:clrMapOvr>
+    <a:masterClrMapping/>
+  </p:clrMapOvr>
+</p:sld>
+</file>
+
+<file path=ppt/slides/slide17.xml><?xml version="1.0" encoding="utf-8"?>
+<p:sld xmlns:a="http://schemas.openxmlformats.org/drawingml/2006/main" xmlns:r="http://schemas.openxmlformats.org/officeDocument/2006/relationships" xmlns:p="http://schemas.openxmlformats.org/presentationml/2006/main">
+  <p:cSld>
+    <p:spTree>
+      <p:nvGrpSpPr>
+        <p:cNvPr id="1" name=""/>
+        <p:cNvGrpSpPr/>
+        <p:nvPr/>
+      </p:nvGrpSpPr>
+      <p:grpSpPr>
+        <a:xfrm>
+          <a:off x="0" y="0"/>
+          <a:ext cx="0" cy="0"/>
+          <a:chOff x="0" y="0"/>
+          <a:chExt cx="0" cy="0"/>
+        </a:xfrm>
+      </p:grpSpPr>
+      <p:sp>
+        <p:nvSpPr>
+          <p:cNvPr id="2" name="Title 1"/>
+          <p:cNvSpPr>
+            <a:spLocks noGrp="1"/>
+          </p:cNvSpPr>
+          <p:nvPr>
+            <p:ph type="title"/>
+          </p:nvPr>
+        </p:nvSpPr>
+        <p:spPr/>
+        <p:txBody>
+          <a:bodyPr/>
+          <a:lstStyle/>
+          <a:p>
+            <a:pPr algn="ctr"/>
+            <a:r>
+              <a:rPr lang="bg-BG" dirty="0" smtClean="0"/>
+              <a:t>Основни принципи на </a:t>
+            </a:r>
+            <a:r>
+              <a:rPr lang="bg-BG" dirty="0" err="1" smtClean="0"/>
+              <a:t>ооп</a:t>
+            </a:r>
+            <a:endParaRPr lang="en-US" dirty="0"/>
+          </a:p>
+        </p:txBody>
+      </p:sp>
+      <p:sp>
+        <p:nvSpPr>
+          <p:cNvPr id="3" name="Content Placeholder 2"/>
+          <p:cNvSpPr>
+            <a:spLocks noGrp="1"/>
+          </p:cNvSpPr>
+          <p:nvPr>
+            <p:ph idx="1"/>
+          </p:nvPr>
+        </p:nvSpPr>
+        <p:spPr/>
+        <p:txBody>
+          <a:bodyPr/>
+          <a:lstStyle/>
+          <a:p>
+            <a:r>
+              <a:rPr lang="bg-BG" dirty="0" smtClean="0"/>
+              <a:t>Наследяване </a:t>
+            </a:r>
+          </a:p>
+          <a:p>
+            <a:r>
+              <a:rPr lang="bg-BG" dirty="0" err="1" smtClean="0"/>
+              <a:t>Капсулация</a:t>
+            </a:r>
+            <a:endParaRPr lang="bg-BG" dirty="0" smtClean="0"/>
+          </a:p>
+          <a:p>
+            <a:r>
+              <a:rPr lang="bg-BG" dirty="0" smtClean="0"/>
+              <a:t>Полиморфизъм</a:t>
+            </a:r>
+            <a:endParaRPr lang="en-US" dirty="0"/>
+          </a:p>
+        </p:txBody>
+      </p:sp>
+    </p:spTree>
+    <p:extLst>
+      <p:ext uri="{BB962C8B-B14F-4D97-AF65-F5344CB8AC3E}">
+        <p14:creationId xmlns:p14="http://schemas.microsoft.com/office/powerpoint/2010/main" val="3394135980"/>
+      </p:ext>
+    </p:extLst>
+  </p:cSld>
+  <p:clrMapOvr>
+    <a:masterClrMapping/>
+  </p:clrMapOvr>
+</p:sld>
+</file>
+
+<file path=ppt/slides/slide18.xml><?xml version="1.0" encoding="utf-8"?>
+<p:sld xmlns:a="http://schemas.openxmlformats.org/drawingml/2006/main" xmlns:r="http://schemas.openxmlformats.org/officeDocument/2006/relationships" xmlns:p="http://schemas.openxmlformats.org/presentationml/2006/main">
+  <p:cSld>
+    <p:spTree>
+      <p:nvGrpSpPr>
+        <p:cNvPr id="1" name=""/>
+        <p:cNvGrpSpPr/>
+        <p:nvPr/>
+      </p:nvGrpSpPr>
+      <p:grpSpPr>
+        <a:xfrm>
+          <a:off x="0" y="0"/>
+          <a:ext cx="0" cy="0"/>
+          <a:chOff x="0" y="0"/>
+          <a:chExt cx="0" cy="0"/>
+        </a:xfrm>
+      </p:grpSpPr>
+      <p:sp>
+        <p:nvSpPr>
+          <p:cNvPr id="2" name="Title 1"/>
+          <p:cNvSpPr>
+            <a:spLocks noGrp="1"/>
+          </p:cNvSpPr>
+          <p:nvPr>
+            <p:ph type="title"/>
+          </p:nvPr>
+        </p:nvSpPr>
+        <p:spPr/>
+        <p:txBody>
+          <a:bodyPr/>
+          <a:lstStyle/>
+          <a:p>
+            <a:pPr algn="ctr"/>
+            <a:r>
+              <a:rPr lang="bg-BG" dirty="0"/>
+              <a:t>Основни принципи на </a:t>
+            </a:r>
+            <a:r>
+              <a:rPr lang="bg-BG" dirty="0" err="1" smtClean="0"/>
+              <a:t>ооп</a:t>
+            </a:r>
+            <a:r>
+              <a:rPr lang="bg-BG" dirty="0" smtClean="0"/>
+              <a:t> демо</a:t>
+            </a:r>
+            <a:endParaRPr lang="en-US" dirty="0"/>
+          </a:p>
+        </p:txBody>
+      </p:sp>
+      <p:pic>
+        <p:nvPicPr>
+          <p:cNvPr id="4098" name="Picture 2" descr="http://wearelaunchbox.com/wp-content/uploads/2012/11/oop-basics.png"/>
+          <p:cNvPicPr>
+            <a:picLocks noChangeAspect="1" noChangeArrowheads="1"/>
+          </p:cNvPicPr>
+          <p:nvPr/>
+        </p:nvPicPr>
+        <p:blipFill>
+          <a:blip r:embed="rId2">
+            <a:extLst>
+              <a:ext uri="{28A0092B-C50C-407E-A947-70E740481C1C}">
+                <a14:useLocalDpi xmlns:a14="http://schemas.microsoft.com/office/drawing/2010/main" val="0"/>
+              </a:ext>
+            </a:extLst>
+          </a:blip>
+          <a:srcRect/>
+          <a:stretch>
+            <a:fillRect/>
+          </a:stretch>
+        </p:blipFill>
+        <p:spPr bwMode="auto">
+          <a:xfrm>
+            <a:off x="1598903" y="3004208"/>
+            <a:ext cx="8991018" cy="2849074"/>
+          </a:xfrm>
+          <a:prstGeom prst="rect">
+            <a:avLst/>
+          </a:prstGeom>
+          <a:noFill/>
+          <a:extLst>
+            <a:ext uri="{909E8E84-426E-40DD-AFC4-6F175D3DCCD1}">
+              <a14:hiddenFill xmlns:a14="http://schemas.microsoft.com/office/drawing/2010/main">
+                <a:solidFill>
+                  <a:srgbClr val="FFFFFF"/>
+                </a:solidFill>
+              </a14:hiddenFill>
+            </a:ext>
+          </a:extLst>
+        </p:spPr>
+      </p:pic>
+    </p:spTree>
+    <p:extLst>
+      <p:ext uri="{BB962C8B-B14F-4D97-AF65-F5344CB8AC3E}">
+        <p14:creationId xmlns:p14="http://schemas.microsoft.com/office/powerpoint/2010/main" val="1317519244"/>
+      </p:ext>
+    </p:extLst>
+  </p:cSld>
+  <p:clrMapOvr>
+    <a:masterClrMapping/>
+  </p:clrMapOvr>
+</p:sld>
+</file>
+
+<file path=ppt/slides/slide19.xml><?xml version="1.0" encoding="utf-8"?>
+<p:sld xmlns:a="http://schemas.openxmlformats.org/drawingml/2006/main" xmlns:r="http://schemas.openxmlformats.org/officeDocument/2006/relationships" xmlns:p="http://schemas.openxmlformats.org/presentationml/2006/main">
+  <p:cSld>
+    <p:spTree>
+      <p:nvGrpSpPr>
+        <p:cNvPr id="1" name=""/>
+        <p:cNvGrpSpPr/>
+        <p:nvPr/>
+      </p:nvGrpSpPr>
+      <p:grpSpPr>
+        <a:xfrm>
+          <a:off x="0" y="0"/>
+          <a:ext cx="0" cy="0"/>
+          <a:chOff x="0" y="0"/>
+          <a:chExt cx="0" cy="0"/>
+        </a:xfrm>
+      </p:grpSpPr>
+      <p:sp>
+        <p:nvSpPr>
+          <p:cNvPr id="2" name="Title 1"/>
+          <p:cNvSpPr>
+            <a:spLocks noGrp="1"/>
+          </p:cNvSpPr>
+          <p:nvPr>
+            <p:ph type="title"/>
+          </p:nvPr>
+        </p:nvSpPr>
+        <p:spPr/>
+        <p:txBody>
+          <a:bodyPr/>
+          <a:lstStyle/>
+          <a:p>
+            <a:pPr algn="ctr"/>
+            <a:r>
+              <a:rPr lang="bg-BG" dirty="0" smtClean="0"/>
+              <a:t>задача</a:t>
+            </a:r>
+            <a:endParaRPr lang="en-US" dirty="0"/>
+          </a:p>
+        </p:txBody>
+      </p:sp>
+      <p:sp>
+        <p:nvSpPr>
+          <p:cNvPr id="3" name="Content Placeholder 2"/>
+          <p:cNvSpPr>
+            <a:spLocks noGrp="1"/>
+          </p:cNvSpPr>
+          <p:nvPr>
+            <p:ph idx="1"/>
+          </p:nvPr>
+        </p:nvSpPr>
+        <p:spPr/>
+        <p:txBody>
+          <a:bodyPr>
+            <a:normAutofit fontScale="85000" lnSpcReduction="20000"/>
+          </a:bodyPr>
+          <a:lstStyle/>
+          <a:p>
+            <a:r>
+              <a:rPr lang="bg-BG" dirty="0" smtClean="0"/>
+              <a:t>Създайте абстрактен клас </a:t>
+            </a:r>
+            <a:r>
+              <a:rPr lang="en-US" dirty="0" smtClean="0"/>
+              <a:t>HUMAN </a:t>
+            </a:r>
+            <a:r>
+              <a:rPr lang="bg-BG" dirty="0" smtClean="0"/>
+              <a:t>съдържащ поле за име и един абстрактен метод </a:t>
+            </a:r>
+            <a:r>
+              <a:rPr lang="en-US" dirty="0" smtClean="0"/>
+              <a:t>identify. </a:t>
+            </a:r>
+            <a:endParaRPr lang="en-US" dirty="0"/>
+          </a:p>
+          <a:p>
+            <a:r>
+              <a:rPr lang="bg-BG" dirty="0" smtClean="0"/>
+              <a:t>Създайте клас </a:t>
+            </a:r>
+            <a:r>
+              <a:rPr lang="en-US" dirty="0" smtClean="0"/>
+              <a:t>Student</a:t>
+            </a:r>
+            <a:r>
+              <a:rPr lang="bg-BG" dirty="0" smtClean="0"/>
+              <a:t> който наследява </a:t>
+            </a:r>
+            <a:r>
+              <a:rPr lang="en-US" dirty="0" smtClean="0"/>
+              <a:t>Human </a:t>
+            </a:r>
+            <a:r>
+              <a:rPr lang="bg-BG" dirty="0" smtClean="0"/>
+              <a:t>и съдържа полета за университет и специалност</a:t>
+            </a:r>
+          </a:p>
+          <a:p>
+            <a:r>
+              <a:rPr lang="bg-BG" dirty="0"/>
+              <a:t>Създайте</a:t>
+            </a:r>
+            <a:r>
+              <a:rPr lang="bg-BG" dirty="0" smtClean="0"/>
+              <a:t> клас </a:t>
+            </a:r>
+            <a:r>
+              <a:rPr lang="en-US" dirty="0" smtClean="0"/>
+              <a:t>Employee </a:t>
+            </a:r>
+            <a:r>
+              <a:rPr lang="bg-BG" dirty="0" smtClean="0"/>
+              <a:t>който наследява </a:t>
+            </a:r>
+            <a:r>
+              <a:rPr lang="en-US" dirty="0" smtClean="0"/>
+              <a:t>Human </a:t>
+            </a:r>
+            <a:r>
+              <a:rPr lang="bg-BG" dirty="0" smtClean="0"/>
+              <a:t>и съдържа полета за месторабота и месечна заплата</a:t>
+            </a:r>
+          </a:p>
+          <a:p>
+            <a:r>
+              <a:rPr lang="bg-BG" dirty="0" smtClean="0"/>
+              <a:t>Създайте клас </a:t>
+            </a:r>
+            <a:r>
+              <a:rPr lang="en-US" dirty="0"/>
+              <a:t>P</a:t>
+            </a:r>
+            <a:r>
+              <a:rPr lang="en-US" dirty="0" smtClean="0"/>
+              <a:t>ensioner</a:t>
+            </a:r>
+            <a:r>
+              <a:rPr lang="bg-BG" dirty="0" smtClean="0"/>
+              <a:t> който наследява </a:t>
+            </a:r>
+            <a:r>
+              <a:rPr lang="en-US" dirty="0" smtClean="0"/>
+              <a:t>Human </a:t>
+            </a:r>
+            <a:r>
+              <a:rPr lang="bg-BG" dirty="0" smtClean="0"/>
+              <a:t>и съдържа поле за пенсия</a:t>
+            </a:r>
+          </a:p>
+          <a:p>
+            <a:r>
+              <a:rPr lang="bg-BG" dirty="0" smtClean="0"/>
+              <a:t>И в трите класа дайте различна имплементация на метода </a:t>
+            </a:r>
+            <a:r>
+              <a:rPr lang="en-US" dirty="0" err="1" smtClean="0"/>
+              <a:t>indentify</a:t>
+            </a:r>
+            <a:r>
+              <a:rPr lang="bg-BG" dirty="0" smtClean="0"/>
+              <a:t> като изкарвате информация за съответния обект в конзолата</a:t>
+            </a:r>
+            <a:endParaRPr lang="en-US" dirty="0"/>
+          </a:p>
+        </p:txBody>
+      </p:sp>
+    </p:spTree>
+    <p:extLst>
+      <p:ext uri="{BB962C8B-B14F-4D97-AF65-F5344CB8AC3E}">
+        <p14:creationId xmlns:p14="http://schemas.microsoft.com/office/powerpoint/2010/main" val="4021046268"/>
+      </p:ext>
+    </p:extLst>
+  </p:cSld>
+  <p:clrMapOvr>
+    <a:masterClrMapping/>
+  </p:clrMapOvr>
+</p:sld>
+</file>
+
 <file path=ppt/slides/slide2.xml><?xml version="1.0" encoding="utf-8"?>
 <p:sld xmlns:a="http://schemas.openxmlformats.org/drawingml/2006/main" xmlns:r="http://schemas.openxmlformats.org/officeDocument/2006/relationships" xmlns:p="http://schemas.openxmlformats.org/presentationml/2006/main">
   <p:cSld>
@@ -12662,6 +13846,101 @@
     <p:extLst>
       <p:ext uri="{BB962C8B-B14F-4D97-AF65-F5344CB8AC3E}">
         <p14:creationId xmlns:p14="http://schemas.microsoft.com/office/powerpoint/2010/main" val="543617181"/>
+      </p:ext>
+    </p:extLst>
+  </p:cSld>
+  <p:clrMapOvr>
+    <a:masterClrMapping/>
+  </p:clrMapOvr>
+</p:sld>
+</file>
+
+<file path=ppt/slides/slide20.xml><?xml version="1.0" encoding="utf-8"?>
+<p:sld xmlns:a="http://schemas.openxmlformats.org/drawingml/2006/main" xmlns:r="http://schemas.openxmlformats.org/officeDocument/2006/relationships" xmlns:p="http://schemas.openxmlformats.org/presentationml/2006/main">
+  <p:cSld>
+    <p:spTree>
+      <p:nvGrpSpPr>
+        <p:cNvPr id="1" name=""/>
+        <p:cNvGrpSpPr/>
+        <p:nvPr/>
+      </p:nvGrpSpPr>
+      <p:grpSpPr>
+        <a:xfrm>
+          <a:off x="0" y="0"/>
+          <a:ext cx="0" cy="0"/>
+          <a:chOff x="0" y="0"/>
+          <a:chExt cx="0" cy="0"/>
+        </a:xfrm>
+      </p:grpSpPr>
+      <p:sp>
+        <p:nvSpPr>
+          <p:cNvPr id="2" name="Title 1"/>
+          <p:cNvSpPr>
+            <a:spLocks noGrp="1"/>
+          </p:cNvSpPr>
+          <p:nvPr>
+            <p:ph type="title"/>
+          </p:nvPr>
+        </p:nvSpPr>
+        <p:spPr/>
+        <p:txBody>
+          <a:bodyPr/>
+          <a:lstStyle/>
+          <a:p>
+            <a:pPr algn="ctr"/>
+            <a:r>
+              <a:rPr lang="bg-BG" dirty="0" smtClean="0"/>
+              <a:t>Въпроси</a:t>
+            </a:r>
+            <a:endParaRPr lang="en-US" dirty="0"/>
+          </a:p>
+        </p:txBody>
+      </p:sp>
+      <p:pic>
+        <p:nvPicPr>
+          <p:cNvPr id="5122" name="Picture 2" descr="http://en.hdyo.org/assets/ask-question-1-ff9bc6fa5eaa0d7667ae7a5a4c61330c.jpg"/>
+          <p:cNvPicPr>
+            <a:picLocks noChangeAspect="1" noChangeArrowheads="1"/>
+          </p:cNvPicPr>
+          <p:nvPr/>
+        </p:nvPicPr>
+        <p:blipFill>
+          <a:blip r:embed="rId2">
+            <a:extLst>
+              <a:ext uri="{28A0092B-C50C-407E-A947-70E740481C1C}">
+                <a14:useLocalDpi xmlns:a14="http://schemas.microsoft.com/office/drawing/2010/main" val="0"/>
+              </a:ext>
+            </a:extLst>
+          </a:blip>
+          <a:srcRect/>
+          <a:stretch>
+            <a:fillRect/>
+          </a:stretch>
+        </p:blipFill>
+        <p:spPr bwMode="auto">
+          <a:xfrm>
+            <a:off x="3317231" y="2097088"/>
+            <a:ext cx="5554362" cy="4199097"/>
+          </a:xfrm>
+          <a:prstGeom prst="rect">
+            <a:avLst/>
+          </a:prstGeom>
+          <a:noFill/>
+          <a:extLst>
+            <a:ext uri="{909E8E84-426E-40DD-AFC4-6F175D3DCCD1}">
+              <a14:hiddenFill xmlns:a14="http://schemas.microsoft.com/office/drawing/2010/main">
+                <a:solidFill>
+                  <a:srgbClr val="FFFFFF"/>
+                </a:solidFill>
+              </a14:hiddenFill>
+            </a:ext>
+          </a:extLst>
+        </p:spPr>
+      </p:pic>
+    </p:spTree>
+    <p:extLst>
+      <p:ext uri="{BB962C8B-B14F-4D97-AF65-F5344CB8AC3E}">
+        <p14:creationId xmlns:p14="http://schemas.microsoft.com/office/powerpoint/2010/main" val="3475126546"/>
       </p:ext>
     </p:extLst>
   </p:cSld>

</xml_diff>